<commit_message>
updating session 3 slides
</commit_message>
<xml_diff>
--- a/Session5_Version_Control/2022_source_control.pptx
+++ b/Session5_Version_Control/2022_source_control.pptx
@@ -8,10 +8,10 @@
     <p:notesMasterId r:id="rId23"/>
   </p:notesMasterIdLst>
   <p:sldIdLst>
-    <p:sldId id="256" r:id="rId2"/>
-    <p:sldId id="271" r:id="rId3"/>
-    <p:sldId id="261" r:id="rId4"/>
-    <p:sldId id="291" r:id="rId5"/>
+    <p:sldId id="291" r:id="rId2"/>
+    <p:sldId id="256" r:id="rId3"/>
+    <p:sldId id="271" r:id="rId4"/>
+    <p:sldId id="261" r:id="rId5"/>
     <p:sldId id="257" r:id="rId6"/>
     <p:sldId id="286" r:id="rId7"/>
     <p:sldId id="262" r:id="rId8"/>
@@ -1760,7 +1760,7 @@
   <p:cSld>
     <p:spTree>
       <p:nvGrpSpPr>
-        <p:cNvPr id="1" name="Shape 44"/>
+        <p:cNvPr id="1" name="Shape 97"/>
         <p:cNvGrpSpPr/>
         <p:nvPr/>
       </p:nvGrpSpPr>
@@ -1774,7 +1774,7 @@
       </p:grpSpPr>
       <p:sp>
         <p:nvSpPr>
-          <p:cNvPr id="45" name="Google Shape;45;p1:notes"/>
+          <p:cNvPr id="98" name="Google Shape;98;ge6d407e7a1_0_0:notes"/>
           <p:cNvSpPr>
             <a:spLocks noGrp="1" noRot="1" noChangeAspect="1"/>
           </p:cNvSpPr>
@@ -1825,7 +1825,7 @@
       </p:sp>
       <p:sp>
         <p:nvSpPr>
-          <p:cNvPr id="46" name="Google Shape;46;p1:notes"/>
+          <p:cNvPr id="99" name="Google Shape;99;ge6d407e7a1_0_0:notes"/>
           <p:cNvSpPr txBox="1">
             <a:spLocks noGrp="1"/>
           </p:cNvSpPr>
@@ -1836,7 +1836,7 @@
         <p:spPr>
           <a:xfrm>
             <a:off x="701040" y="4387136"/>
-            <a:ext cx="5608320" cy="4156234"/>
+            <a:ext cx="5608200" cy="4156200"/>
           </a:xfrm>
           <a:prstGeom prst="rect">
             <a:avLst/>
@@ -1867,7 +1867,7 @@
             </a:pPr>
             <a:r>
               <a:rPr lang="en-US"/>
-              <a:t>Welcome. We are so happy you’re here.</a:t>
+              <a:t>One final thought about repdocudibility…</a:t>
             </a:r>
             <a:endParaRPr/>
           </a:p>
@@ -1885,6 +1885,10 @@
               <a:buSzPts val="1400"/>
               <a:buNone/>
             </a:pPr>
+            <a:r>
+              <a:rPr lang="en-US"/>
+              <a:t>To reproduce results implies that you were able to produce them correctly in the first place.</a:t>
+            </a:r>
             <a:endParaRPr/>
           </a:p>
           <a:p>
@@ -1901,9 +1905,25 @@
               <a:buSzPts val="1400"/>
               <a:buNone/>
             </a:pPr>
+            <a:endParaRPr/>
+          </a:p>
+          <a:p>
+            <a:pPr marL="0" lvl="0" indent="0" algn="l" rtl="0">
+              <a:lnSpc>
+                <a:spcPct val="100000"/>
+              </a:lnSpc>
+              <a:spcBef>
+                <a:spcPts val="0"/>
+              </a:spcBef>
+              <a:spcAft>
+                <a:spcPts val="0"/>
+              </a:spcAft>
+              <a:buSzPts val="1400"/>
+              <a:buNone/>
+            </a:pPr>
             <a:r>
               <a:rPr lang="en-US"/>
-              <a:t>What you are about to hear next is about the closest you will get to a lecture in this workshop series. Most of the rest of this will be pretty interactive. </a:t>
+              <a:t>So throughout the workshops, we will try to emphasize the virtue of breaking your problems into smaller pieces</a:t>
             </a:r>
             <a:endParaRPr/>
           </a:p>
@@ -1923,7 +1943,7 @@
             </a:pPr>
             <a:r>
               <a:rPr lang="en-US"/>
-              <a:t>Later we will have discussions, demonstrations where you can follow along, and maybe try to solve a few problems yourself.</a:t>
+              <a:t>And then testing them relentlessly to convince yourself they are doing what you expect them to do.</a:t>
             </a:r>
             <a:endParaRPr/>
           </a:p>
@@ -1941,85 +1961,17 @@
               <a:buSzPts val="1400"/>
               <a:buNone/>
             </a:pPr>
-            <a:endParaRPr/>
-          </a:p>
-          <a:p>
-            <a:pPr marL="0" lvl="0" indent="0" algn="l" rtl="0">
-              <a:lnSpc>
-                <a:spcPct val="100000"/>
-              </a:lnSpc>
-              <a:spcBef>
-                <a:spcPts val="0"/>
-              </a:spcBef>
-              <a:spcAft>
-                <a:spcPts val="0"/>
-              </a:spcAft>
-              <a:buSzPts val="1400"/>
-              <a:buNone/>
-            </a:pPr>
             <a:r>
               <a:rPr lang="en-US"/>
-              <a:t>But before we start showing you tools and how to apply them to your research work, first let me want talk a bit about reproducibility of your work.</a:t>
-            </a:r>
-            <a:endParaRPr/>
-          </a:p>
-          <a:p>
-            <a:pPr marL="0" lvl="0" indent="0" algn="l" rtl="0">
-              <a:lnSpc>
-                <a:spcPct val="100000"/>
-              </a:lnSpc>
-              <a:spcBef>
-                <a:spcPts val="0"/>
-              </a:spcBef>
-              <a:spcAft>
-                <a:spcPts val="0"/>
-              </a:spcAft>
-              <a:buSzPts val="1400"/>
-              <a:buNone/>
-            </a:pPr>
-            <a:r>
-              <a:rPr lang="en-US"/>
-              <a:t>It is a very important topic, and I believe there are a few general principles that, if kept in mind, can help you quite a lot in the future.</a:t>
-            </a:r>
-            <a:endParaRPr/>
-          </a:p>
-          <a:p>
-            <a:pPr marL="0" lvl="0" indent="0" algn="l" rtl="0">
-              <a:lnSpc>
-                <a:spcPct val="100000"/>
-              </a:lnSpc>
-              <a:spcBef>
-                <a:spcPts val="0"/>
-              </a:spcBef>
-              <a:spcAft>
-                <a:spcPts val="0"/>
-              </a:spcAft>
-              <a:buSzPts val="1400"/>
-              <a:buNone/>
-            </a:pPr>
-            <a:endParaRPr/>
-          </a:p>
-          <a:p>
-            <a:pPr marL="0" lvl="0" indent="0" algn="l" rtl="0">
-              <a:lnSpc>
-                <a:spcPct val="100000"/>
-              </a:lnSpc>
-              <a:spcBef>
-                <a:spcPts val="0"/>
-              </a:spcBef>
-              <a:spcAft>
-                <a:spcPts val="0"/>
-              </a:spcAft>
-              <a:buSzPts val="1400"/>
-              <a:buNone/>
-            </a:pPr>
+              <a:t>Near the end of the series, one of our hours will be dedicated to helping you make your code “bulletproof.”</a:t>
+            </a:r>
             <a:endParaRPr/>
           </a:p>
         </p:txBody>
       </p:sp>
       <p:sp>
         <p:nvSpPr>
-          <p:cNvPr id="47" name="Google Shape;47;p1:notes"/>
+          <p:cNvPr id="100" name="Google Shape;100;ge6d407e7a1_0_0:notes"/>
           <p:cNvSpPr txBox="1">
             <a:spLocks noGrp="1"/>
           </p:cNvSpPr>
@@ -2030,7 +1982,7 @@
         <p:spPr>
           <a:xfrm>
             <a:off x="3970938" y="8772669"/>
-            <a:ext cx="3037840" cy="461804"/>
+            <a:ext cx="3037800" cy="461700"/>
           </a:xfrm>
           <a:prstGeom prst="rect">
             <a:avLst/>
@@ -2068,6 +2020,11 @@
         </p:txBody>
       </p:sp>
     </p:spTree>
+    <p:extLst>
+      <p:ext uri="{BB962C8B-B14F-4D97-AF65-F5344CB8AC3E}">
+        <p14:creationId xmlns:p14="http://schemas.microsoft.com/office/powerpoint/2010/main" val="845802100"/>
+      </p:ext>
+    </p:extLst>
   </p:cSld>
   <p:clrMapOvr>
     <a:masterClrMapping/>
@@ -4750,7 +4707,7 @@
   <p:cSld>
     <p:spTree>
       <p:nvGrpSpPr>
-        <p:cNvPr id="1" name="Shape 51"/>
+        <p:cNvPr id="1" name="Shape 44"/>
         <p:cNvGrpSpPr/>
         <p:nvPr/>
       </p:nvGrpSpPr>
@@ -4764,7 +4721,7 @@
       </p:grpSpPr>
       <p:sp>
         <p:nvSpPr>
-          <p:cNvPr id="52" name="Google Shape;52;p2:notes"/>
+          <p:cNvPr id="45" name="Google Shape;45;p1:notes"/>
           <p:cNvSpPr>
             <a:spLocks noGrp="1" noRot="1" noChangeAspect="1"/>
           </p:cNvSpPr>
@@ -4815,7 +4772,7 @@
       </p:sp>
       <p:sp>
         <p:nvSpPr>
-          <p:cNvPr id="53" name="Google Shape;53;p2:notes"/>
+          <p:cNvPr id="46" name="Google Shape;46;p1:notes"/>
           <p:cNvSpPr txBox="1">
             <a:spLocks noGrp="1"/>
           </p:cNvSpPr>
@@ -4826,7 +4783,7 @@
         <p:spPr>
           <a:xfrm>
             <a:off x="701040" y="4387136"/>
-            <a:ext cx="5608200" cy="4156200"/>
+            <a:ext cx="5608320" cy="4156234"/>
           </a:xfrm>
           <a:prstGeom prst="rect">
             <a:avLst/>
@@ -4855,13 +4812,161 @@
               <a:buSzPts val="1400"/>
               <a:buNone/>
             </a:pPr>
-            <a:endParaRPr dirty="0"/>
+            <a:r>
+              <a:rPr lang="en-US"/>
+              <a:t>Welcome. We are so happy you’re here.</a:t>
+            </a:r>
+            <a:endParaRPr/>
+          </a:p>
+          <a:p>
+            <a:pPr marL="0" lvl="0" indent="0" algn="l" rtl="0">
+              <a:lnSpc>
+                <a:spcPct val="100000"/>
+              </a:lnSpc>
+              <a:spcBef>
+                <a:spcPts val="0"/>
+              </a:spcBef>
+              <a:spcAft>
+                <a:spcPts val="0"/>
+              </a:spcAft>
+              <a:buSzPts val="1400"/>
+              <a:buNone/>
+            </a:pPr>
+            <a:endParaRPr/>
+          </a:p>
+          <a:p>
+            <a:pPr marL="0" lvl="0" indent="0" algn="l" rtl="0">
+              <a:lnSpc>
+                <a:spcPct val="100000"/>
+              </a:lnSpc>
+              <a:spcBef>
+                <a:spcPts val="0"/>
+              </a:spcBef>
+              <a:spcAft>
+                <a:spcPts val="0"/>
+              </a:spcAft>
+              <a:buSzPts val="1400"/>
+              <a:buNone/>
+            </a:pPr>
+            <a:r>
+              <a:rPr lang="en-US"/>
+              <a:t>What you are about to hear next is about the closest you will get to a lecture in this workshop series. Most of the rest of this will be pretty interactive. </a:t>
+            </a:r>
+            <a:endParaRPr/>
+          </a:p>
+          <a:p>
+            <a:pPr marL="0" lvl="0" indent="0" algn="l" rtl="0">
+              <a:lnSpc>
+                <a:spcPct val="100000"/>
+              </a:lnSpc>
+              <a:spcBef>
+                <a:spcPts val="0"/>
+              </a:spcBef>
+              <a:spcAft>
+                <a:spcPts val="0"/>
+              </a:spcAft>
+              <a:buSzPts val="1400"/>
+              <a:buNone/>
+            </a:pPr>
+            <a:r>
+              <a:rPr lang="en-US"/>
+              <a:t>Later we will have discussions, demonstrations where you can follow along, and maybe try to solve a few problems yourself.</a:t>
+            </a:r>
+            <a:endParaRPr/>
+          </a:p>
+          <a:p>
+            <a:pPr marL="0" lvl="0" indent="0" algn="l" rtl="0">
+              <a:lnSpc>
+                <a:spcPct val="100000"/>
+              </a:lnSpc>
+              <a:spcBef>
+                <a:spcPts val="0"/>
+              </a:spcBef>
+              <a:spcAft>
+                <a:spcPts val="0"/>
+              </a:spcAft>
+              <a:buSzPts val="1400"/>
+              <a:buNone/>
+            </a:pPr>
+            <a:endParaRPr/>
+          </a:p>
+          <a:p>
+            <a:pPr marL="0" lvl="0" indent="0" algn="l" rtl="0">
+              <a:lnSpc>
+                <a:spcPct val="100000"/>
+              </a:lnSpc>
+              <a:spcBef>
+                <a:spcPts val="0"/>
+              </a:spcBef>
+              <a:spcAft>
+                <a:spcPts val="0"/>
+              </a:spcAft>
+              <a:buSzPts val="1400"/>
+              <a:buNone/>
+            </a:pPr>
+            <a:r>
+              <a:rPr lang="en-US"/>
+              <a:t>But before we start showing you tools and how to apply them to your research work, first let me want talk a bit about reproducibility of your work.</a:t>
+            </a:r>
+            <a:endParaRPr/>
+          </a:p>
+          <a:p>
+            <a:pPr marL="0" lvl="0" indent="0" algn="l" rtl="0">
+              <a:lnSpc>
+                <a:spcPct val="100000"/>
+              </a:lnSpc>
+              <a:spcBef>
+                <a:spcPts val="0"/>
+              </a:spcBef>
+              <a:spcAft>
+                <a:spcPts val="0"/>
+              </a:spcAft>
+              <a:buSzPts val="1400"/>
+              <a:buNone/>
+            </a:pPr>
+            <a:r>
+              <a:rPr lang="en-US"/>
+              <a:t>It is a very important topic, and I believe there are a few general principles that, if kept in mind, can help you quite a lot in the future.</a:t>
+            </a:r>
+            <a:endParaRPr/>
+          </a:p>
+          <a:p>
+            <a:pPr marL="0" lvl="0" indent="0" algn="l" rtl="0">
+              <a:lnSpc>
+                <a:spcPct val="100000"/>
+              </a:lnSpc>
+              <a:spcBef>
+                <a:spcPts val="0"/>
+              </a:spcBef>
+              <a:spcAft>
+                <a:spcPts val="0"/>
+              </a:spcAft>
+              <a:buSzPts val="1400"/>
+              <a:buNone/>
+            </a:pPr>
+            <a:endParaRPr/>
+          </a:p>
+          <a:p>
+            <a:pPr marL="0" lvl="0" indent="0" algn="l" rtl="0">
+              <a:lnSpc>
+                <a:spcPct val="100000"/>
+              </a:lnSpc>
+              <a:spcBef>
+                <a:spcPts val="0"/>
+              </a:spcBef>
+              <a:spcAft>
+                <a:spcPts val="0"/>
+              </a:spcAft>
+              <a:buSzPts val="1400"/>
+              <a:buNone/>
+            </a:pPr>
+            <a:endParaRPr/>
           </a:p>
         </p:txBody>
       </p:sp>
       <p:sp>
         <p:nvSpPr>
-          <p:cNvPr id="54" name="Google Shape;54;p2:notes"/>
+          <p:cNvPr id="47" name="Google Shape;47;p1:notes"/>
           <p:cNvSpPr txBox="1">
             <a:spLocks noGrp="1"/>
           </p:cNvSpPr>
@@ -4872,7 +4977,7 @@
         <p:spPr>
           <a:xfrm>
             <a:off x="3970938" y="8772669"/>
-            <a:ext cx="3037800" cy="461700"/>
+            <a:ext cx="3037840" cy="461804"/>
           </a:xfrm>
           <a:prstGeom prst="rect">
             <a:avLst/>
@@ -4910,11 +5015,6 @@
         </p:txBody>
       </p:sp>
     </p:spTree>
-    <p:extLst>
-      <p:ext uri="{BB962C8B-B14F-4D97-AF65-F5344CB8AC3E}">
-        <p14:creationId xmlns:p14="http://schemas.microsoft.com/office/powerpoint/2010/main" val="2311059827"/>
-      </p:ext>
-    </p:extLst>
   </p:cSld>
   <p:clrMapOvr>
     <a:masterClrMapping/>
@@ -5481,6 +5581,183 @@
   <p:cSld>
     <p:spTree>
       <p:nvGrpSpPr>
+        <p:cNvPr id="1" name="Shape 51"/>
+        <p:cNvGrpSpPr/>
+        <p:nvPr/>
+      </p:nvGrpSpPr>
+      <p:grpSpPr>
+        <a:xfrm>
+          <a:off x="0" y="0"/>
+          <a:ext cx="0" cy="0"/>
+          <a:chOff x="0" y="0"/>
+          <a:chExt cx="0" cy="0"/>
+        </a:xfrm>
+      </p:grpSpPr>
+      <p:sp>
+        <p:nvSpPr>
+          <p:cNvPr id="52" name="Google Shape;52;p2:notes"/>
+          <p:cNvSpPr>
+            <a:spLocks noGrp="1" noRot="1" noChangeAspect="1"/>
+          </p:cNvSpPr>
+          <p:nvPr>
+            <p:ph type="sldImg" idx="2"/>
+          </p:nvPr>
+        </p:nvSpPr>
+        <p:spPr>
+          <a:xfrm>
+            <a:off x="1195388" y="692150"/>
+            <a:ext cx="4619625" cy="3463925"/>
+          </a:xfrm>
+          <a:custGeom>
+            <a:avLst/>
+            <a:gdLst/>
+            <a:ahLst/>
+            <a:cxnLst/>
+            <a:rect l="l" t="t" r="r" b="b"/>
+            <a:pathLst>
+              <a:path w="120000" h="120000" extrusionOk="0">
+                <a:moveTo>
+                  <a:pt x="0" y="0"/>
+                </a:moveTo>
+                <a:lnTo>
+                  <a:pt x="120000" y="0"/>
+                </a:lnTo>
+                <a:lnTo>
+                  <a:pt x="120000" y="120000"/>
+                </a:lnTo>
+                <a:lnTo>
+                  <a:pt x="0" y="120000"/>
+                </a:lnTo>
+                <a:close/>
+              </a:path>
+            </a:pathLst>
+          </a:custGeom>
+          <a:noFill/>
+          <a:ln w="12700" cap="flat" cmpd="sng">
+            <a:solidFill>
+              <a:srgbClr val="000000"/>
+            </a:solidFill>
+            <a:prstDash val="solid"/>
+            <a:round/>
+            <a:headEnd type="none" w="sm" len="sm"/>
+            <a:tailEnd type="none" w="sm" len="sm"/>
+          </a:ln>
+        </p:spPr>
+      </p:sp>
+      <p:sp>
+        <p:nvSpPr>
+          <p:cNvPr id="53" name="Google Shape;53;p2:notes"/>
+          <p:cNvSpPr txBox="1">
+            <a:spLocks noGrp="1"/>
+          </p:cNvSpPr>
+          <p:nvPr>
+            <p:ph type="body" idx="1"/>
+          </p:nvPr>
+        </p:nvSpPr>
+        <p:spPr>
+          <a:xfrm>
+            <a:off x="701040" y="4387136"/>
+            <a:ext cx="5608200" cy="4156200"/>
+          </a:xfrm>
+          <a:prstGeom prst="rect">
+            <a:avLst/>
+          </a:prstGeom>
+          <a:noFill/>
+          <a:ln>
+            <a:noFill/>
+          </a:ln>
+        </p:spPr>
+        <p:txBody>
+          <a:bodyPr spcFirstLastPara="1" wrap="square" lIns="93175" tIns="46575" rIns="93175" bIns="46575" anchor="t" anchorCtr="0">
+            <a:noAutofit/>
+          </a:bodyPr>
+          <a:lstStyle/>
+          <a:p>
+            <a:pPr marL="0" lvl="0" indent="0" algn="l" rtl="0">
+              <a:lnSpc>
+                <a:spcPct val="100000"/>
+              </a:lnSpc>
+              <a:spcBef>
+                <a:spcPts val="0"/>
+              </a:spcBef>
+              <a:spcAft>
+                <a:spcPts val="0"/>
+              </a:spcAft>
+              <a:buSzPts val="1400"/>
+              <a:buNone/>
+            </a:pPr>
+            <a:endParaRPr dirty="0"/>
+          </a:p>
+        </p:txBody>
+      </p:sp>
+      <p:sp>
+        <p:nvSpPr>
+          <p:cNvPr id="54" name="Google Shape;54;p2:notes"/>
+          <p:cNvSpPr txBox="1">
+            <a:spLocks noGrp="1"/>
+          </p:cNvSpPr>
+          <p:nvPr>
+            <p:ph type="sldNum" idx="12"/>
+          </p:nvPr>
+        </p:nvSpPr>
+        <p:spPr>
+          <a:xfrm>
+            <a:off x="3970938" y="8772669"/>
+            <a:ext cx="3037800" cy="461700"/>
+          </a:xfrm>
+          <a:prstGeom prst="rect">
+            <a:avLst/>
+          </a:prstGeom>
+          <a:noFill/>
+          <a:ln>
+            <a:noFill/>
+          </a:ln>
+        </p:spPr>
+        <p:txBody>
+          <a:bodyPr spcFirstLastPara="1" wrap="square" lIns="93175" tIns="46575" rIns="93175" bIns="46575" anchor="b" anchorCtr="0">
+            <a:noAutofit/>
+          </a:bodyPr>
+          <a:lstStyle/>
+          <a:p>
+            <a:pPr marL="0" lvl="0" indent="0" algn="r" rtl="0">
+              <a:lnSpc>
+                <a:spcPct val="100000"/>
+              </a:lnSpc>
+              <a:spcBef>
+                <a:spcPts val="0"/>
+              </a:spcBef>
+              <a:spcAft>
+                <a:spcPts val="0"/>
+              </a:spcAft>
+              <a:buSzPts val="1400"/>
+              <a:buNone/>
+            </a:pPr>
+            <a:fld id="{00000000-1234-1234-1234-123412341234}" type="slidenum">
+              <a:rPr lang="en-US"/>
+              <a:t>3</a:t>
+            </a:fld>
+            <a:endParaRPr/>
+          </a:p>
+        </p:txBody>
+      </p:sp>
+    </p:spTree>
+    <p:extLst>
+      <p:ext uri="{BB962C8B-B14F-4D97-AF65-F5344CB8AC3E}">
+        <p14:creationId xmlns:p14="http://schemas.microsoft.com/office/powerpoint/2010/main" val="2311059827"/>
+      </p:ext>
+    </p:extLst>
+  </p:cSld>
+  <p:clrMapOvr>
+    <a:masterClrMapping/>
+  </p:clrMapOvr>
+</p:notes>
+</file>
+
+<file path=ppt/notesSlides/notesSlide4.xml><?xml version="1.0" encoding="utf-8"?>
+<p:notes xmlns:a="http://schemas.openxmlformats.org/drawingml/2006/main" xmlns:r="http://schemas.openxmlformats.org/officeDocument/2006/relationships" xmlns:p="http://schemas.openxmlformats.org/presentationml/2006/main" showMasterSp="0" showMasterPhAnim="0">
+  <p:cSld>
+    <p:spTree>
+      <p:nvGrpSpPr>
         <p:cNvPr id="1" name="Shape 88"/>
         <p:cNvGrpSpPr/>
         <p:nvPr/>
@@ -5634,290 +5911,13 @@
             </a:pPr>
             <a:fld id="{00000000-1234-1234-1234-123412341234}" type="slidenum">
               <a:rPr lang="en-US"/>
-              <a:t>3</a:t>
+              <a:t>4</a:t>
             </a:fld>
             <a:endParaRPr/>
           </a:p>
         </p:txBody>
       </p:sp>
     </p:spTree>
-  </p:cSld>
-  <p:clrMapOvr>
-    <a:masterClrMapping/>
-  </p:clrMapOvr>
-</p:notes>
-</file>
-
-<file path=ppt/notesSlides/notesSlide4.xml><?xml version="1.0" encoding="utf-8"?>
-<p:notes xmlns:a="http://schemas.openxmlformats.org/drawingml/2006/main" xmlns:r="http://schemas.openxmlformats.org/officeDocument/2006/relationships" xmlns:p="http://schemas.openxmlformats.org/presentationml/2006/main" showMasterSp="0" showMasterPhAnim="0">
-  <p:cSld>
-    <p:spTree>
-      <p:nvGrpSpPr>
-        <p:cNvPr id="1" name="Shape 97"/>
-        <p:cNvGrpSpPr/>
-        <p:nvPr/>
-      </p:nvGrpSpPr>
-      <p:grpSpPr>
-        <a:xfrm>
-          <a:off x="0" y="0"/>
-          <a:ext cx="0" cy="0"/>
-          <a:chOff x="0" y="0"/>
-          <a:chExt cx="0" cy="0"/>
-        </a:xfrm>
-      </p:grpSpPr>
-      <p:sp>
-        <p:nvSpPr>
-          <p:cNvPr id="98" name="Google Shape;98;ge6d407e7a1_0_0:notes"/>
-          <p:cNvSpPr>
-            <a:spLocks noGrp="1" noRot="1" noChangeAspect="1"/>
-          </p:cNvSpPr>
-          <p:nvPr>
-            <p:ph type="sldImg" idx="2"/>
-          </p:nvPr>
-        </p:nvSpPr>
-        <p:spPr>
-          <a:xfrm>
-            <a:off x="1195388" y="692150"/>
-            <a:ext cx="4619625" cy="3463925"/>
-          </a:xfrm>
-          <a:custGeom>
-            <a:avLst/>
-            <a:gdLst/>
-            <a:ahLst/>
-            <a:cxnLst/>
-            <a:rect l="l" t="t" r="r" b="b"/>
-            <a:pathLst>
-              <a:path w="120000" h="120000" extrusionOk="0">
-                <a:moveTo>
-                  <a:pt x="0" y="0"/>
-                </a:moveTo>
-                <a:lnTo>
-                  <a:pt x="120000" y="0"/>
-                </a:lnTo>
-                <a:lnTo>
-                  <a:pt x="120000" y="120000"/>
-                </a:lnTo>
-                <a:lnTo>
-                  <a:pt x="0" y="120000"/>
-                </a:lnTo>
-                <a:close/>
-              </a:path>
-            </a:pathLst>
-          </a:custGeom>
-          <a:noFill/>
-          <a:ln w="12700" cap="flat" cmpd="sng">
-            <a:solidFill>
-              <a:srgbClr val="000000"/>
-            </a:solidFill>
-            <a:prstDash val="solid"/>
-            <a:round/>
-            <a:headEnd type="none" w="sm" len="sm"/>
-            <a:tailEnd type="none" w="sm" len="sm"/>
-          </a:ln>
-        </p:spPr>
-      </p:sp>
-      <p:sp>
-        <p:nvSpPr>
-          <p:cNvPr id="99" name="Google Shape;99;ge6d407e7a1_0_0:notes"/>
-          <p:cNvSpPr txBox="1">
-            <a:spLocks noGrp="1"/>
-          </p:cNvSpPr>
-          <p:nvPr>
-            <p:ph type="body" idx="1"/>
-          </p:nvPr>
-        </p:nvSpPr>
-        <p:spPr>
-          <a:xfrm>
-            <a:off x="701040" y="4387136"/>
-            <a:ext cx="5608200" cy="4156200"/>
-          </a:xfrm>
-          <a:prstGeom prst="rect">
-            <a:avLst/>
-          </a:prstGeom>
-          <a:noFill/>
-          <a:ln>
-            <a:noFill/>
-          </a:ln>
-        </p:spPr>
-        <p:txBody>
-          <a:bodyPr spcFirstLastPara="1" wrap="square" lIns="93175" tIns="46575" rIns="93175" bIns="46575" anchor="t" anchorCtr="0">
-            <a:noAutofit/>
-          </a:bodyPr>
-          <a:lstStyle/>
-          <a:p>
-            <a:pPr marL="0" lvl="0" indent="0" algn="l" rtl="0">
-              <a:lnSpc>
-                <a:spcPct val="100000"/>
-              </a:lnSpc>
-              <a:spcBef>
-                <a:spcPts val="0"/>
-              </a:spcBef>
-              <a:spcAft>
-                <a:spcPts val="0"/>
-              </a:spcAft>
-              <a:buSzPts val="1400"/>
-              <a:buNone/>
-            </a:pPr>
-            <a:r>
-              <a:rPr lang="en-US"/>
-              <a:t>One final thought about repdocudibility…</a:t>
-            </a:r>
-            <a:endParaRPr/>
-          </a:p>
-          <a:p>
-            <a:pPr marL="0" lvl="0" indent="0" algn="l" rtl="0">
-              <a:lnSpc>
-                <a:spcPct val="100000"/>
-              </a:lnSpc>
-              <a:spcBef>
-                <a:spcPts val="0"/>
-              </a:spcBef>
-              <a:spcAft>
-                <a:spcPts val="0"/>
-              </a:spcAft>
-              <a:buSzPts val="1400"/>
-              <a:buNone/>
-            </a:pPr>
-            <a:r>
-              <a:rPr lang="en-US"/>
-              <a:t>To reproduce results implies that you were able to produce them correctly in the first place.</a:t>
-            </a:r>
-            <a:endParaRPr/>
-          </a:p>
-          <a:p>
-            <a:pPr marL="0" lvl="0" indent="0" algn="l" rtl="0">
-              <a:lnSpc>
-                <a:spcPct val="100000"/>
-              </a:lnSpc>
-              <a:spcBef>
-                <a:spcPts val="0"/>
-              </a:spcBef>
-              <a:spcAft>
-                <a:spcPts val="0"/>
-              </a:spcAft>
-              <a:buSzPts val="1400"/>
-              <a:buNone/>
-            </a:pPr>
-            <a:endParaRPr/>
-          </a:p>
-          <a:p>
-            <a:pPr marL="0" lvl="0" indent="0" algn="l" rtl="0">
-              <a:lnSpc>
-                <a:spcPct val="100000"/>
-              </a:lnSpc>
-              <a:spcBef>
-                <a:spcPts val="0"/>
-              </a:spcBef>
-              <a:spcAft>
-                <a:spcPts val="0"/>
-              </a:spcAft>
-              <a:buSzPts val="1400"/>
-              <a:buNone/>
-            </a:pPr>
-            <a:r>
-              <a:rPr lang="en-US"/>
-              <a:t>So throughout the workshops, we will try to emphasize the virtue of breaking your problems into smaller pieces</a:t>
-            </a:r>
-            <a:endParaRPr/>
-          </a:p>
-          <a:p>
-            <a:pPr marL="0" lvl="0" indent="0" algn="l" rtl="0">
-              <a:lnSpc>
-                <a:spcPct val="100000"/>
-              </a:lnSpc>
-              <a:spcBef>
-                <a:spcPts val="0"/>
-              </a:spcBef>
-              <a:spcAft>
-                <a:spcPts val="0"/>
-              </a:spcAft>
-              <a:buSzPts val="1400"/>
-              <a:buNone/>
-            </a:pPr>
-            <a:r>
-              <a:rPr lang="en-US"/>
-              <a:t>And then testing them relentlessly to convince yourself they are doing what you expect them to do.</a:t>
-            </a:r>
-            <a:endParaRPr/>
-          </a:p>
-          <a:p>
-            <a:pPr marL="0" lvl="0" indent="0" algn="l" rtl="0">
-              <a:lnSpc>
-                <a:spcPct val="100000"/>
-              </a:lnSpc>
-              <a:spcBef>
-                <a:spcPts val="0"/>
-              </a:spcBef>
-              <a:spcAft>
-                <a:spcPts val="0"/>
-              </a:spcAft>
-              <a:buSzPts val="1400"/>
-              <a:buNone/>
-            </a:pPr>
-            <a:r>
-              <a:rPr lang="en-US"/>
-              <a:t>Near the end of the series, one of our hours will be dedicated to helping you make your code “bulletproof.”</a:t>
-            </a:r>
-            <a:endParaRPr/>
-          </a:p>
-        </p:txBody>
-      </p:sp>
-      <p:sp>
-        <p:nvSpPr>
-          <p:cNvPr id="100" name="Google Shape;100;ge6d407e7a1_0_0:notes"/>
-          <p:cNvSpPr txBox="1">
-            <a:spLocks noGrp="1"/>
-          </p:cNvSpPr>
-          <p:nvPr>
-            <p:ph type="sldNum" idx="12"/>
-          </p:nvPr>
-        </p:nvSpPr>
-        <p:spPr>
-          <a:xfrm>
-            <a:off x="3970938" y="8772669"/>
-            <a:ext cx="3037800" cy="461700"/>
-          </a:xfrm>
-          <a:prstGeom prst="rect">
-            <a:avLst/>
-          </a:prstGeom>
-          <a:noFill/>
-          <a:ln>
-            <a:noFill/>
-          </a:ln>
-        </p:spPr>
-        <p:txBody>
-          <a:bodyPr spcFirstLastPara="1" wrap="square" lIns="93175" tIns="46575" rIns="93175" bIns="46575" anchor="b" anchorCtr="0">
-            <a:noAutofit/>
-          </a:bodyPr>
-          <a:lstStyle/>
-          <a:p>
-            <a:pPr marL="0" lvl="0" indent="0" algn="r" rtl="0">
-              <a:lnSpc>
-                <a:spcPct val="100000"/>
-              </a:lnSpc>
-              <a:spcBef>
-                <a:spcPts val="0"/>
-              </a:spcBef>
-              <a:spcAft>
-                <a:spcPts val="0"/>
-              </a:spcAft>
-              <a:buSzPts val="1400"/>
-              <a:buNone/>
-            </a:pPr>
-            <a:fld id="{00000000-1234-1234-1234-123412341234}" type="slidenum">
-              <a:rPr lang="en-US"/>
-              <a:t>4</a:t>
-            </a:fld>
-            <a:endParaRPr/>
-          </a:p>
-        </p:txBody>
-      </p:sp>
-    </p:spTree>
-    <p:extLst>
-      <p:ext uri="{BB962C8B-B14F-4D97-AF65-F5344CB8AC3E}">
-        <p14:creationId xmlns:p14="http://schemas.microsoft.com/office/powerpoint/2010/main" val="845802100"/>
-      </p:ext>
-    </p:extLst>
   </p:cSld>
   <p:clrMapOvr>
     <a:masterClrMapping/>
@@ -13495,7 +13495,7 @@
   <p:cSld>
     <p:spTree>
       <p:nvGrpSpPr>
-        <p:cNvPr id="1" name="Shape 48"/>
+        <p:cNvPr id="1" name="Shape 101"/>
         <p:cNvGrpSpPr/>
         <p:nvPr/>
       </p:nvGrpSpPr>
@@ -13509,18 +13509,18 @@
       </p:grpSpPr>
       <p:sp>
         <p:nvSpPr>
-          <p:cNvPr id="49" name="Google Shape;49;p1"/>
+          <p:cNvPr id="102" name="Google Shape;102;ge6d407e7a1_0_0"/>
           <p:cNvSpPr txBox="1">
             <a:spLocks noGrp="1"/>
           </p:cNvSpPr>
           <p:nvPr>
-            <p:ph type="ctrTitle"/>
+            <p:ph type="title"/>
           </p:nvPr>
         </p:nvSpPr>
         <p:spPr>
           <a:xfrm>
-            <a:off x="233680" y="665766"/>
-            <a:ext cx="8910320" cy="2149314"/>
+            <a:off x="165100" y="0"/>
+            <a:ext cx="8645700" cy="1143000"/>
           </a:xfrm>
           <a:prstGeom prst="rect">
             <a:avLst/>
@@ -13531,7 +13531,7 @@
           </a:ln>
         </p:spPr>
         <p:txBody>
-          <a:bodyPr spcFirstLastPara="1" wrap="square" lIns="91425" tIns="45700" rIns="91425" bIns="45700" anchor="b" anchorCtr="0">
+          <a:bodyPr spcFirstLastPara="1" wrap="square" lIns="91425" tIns="45700" rIns="91425" bIns="45700" anchor="ctr" anchorCtr="0">
             <a:noAutofit/>
           </a:bodyPr>
           <a:lstStyle/>
@@ -13546,31 +13546,12 @@
               <a:spcAft>
                 <a:spcPts val="0"/>
               </a:spcAft>
-              <a:buClr>
-                <a:srgbClr val="3D146F"/>
-              </a:buClr>
-              <a:buSzPts val="4500"/>
-              <a:buFont typeface="Arial"/>
+              <a:buSzPts val="3200"/>
               <a:buNone/>
             </a:pPr>
             <a:r>
               <a:rPr lang="en-US" dirty="0"/>
-              <a:t>Using Git and </a:t>
-            </a:r>
-            <a:r>
-              <a:rPr lang="en-US" dirty="0" err="1"/>
-              <a:t>Github</a:t>
-            </a:r>
-            <a:r>
-              <a:rPr lang="en-US" dirty="0"/>
-              <a:t> on KLC</a:t>
-            </a:r>
-            <a:br>
-              <a:rPr lang="en-US" dirty="0"/>
-            </a:br>
-            <a:r>
-              <a:rPr lang="en-US" sz="2400" dirty="0"/>
-              <a:t>Fellows Workshop</a:t>
+              <a:t>Set up your Conda Environment</a:t>
             </a:r>
             <a:endParaRPr dirty="0"/>
           </a:p>
@@ -13578,18 +13559,18 @@
       </p:sp>
       <p:sp>
         <p:nvSpPr>
-          <p:cNvPr id="50" name="Google Shape;50;p1"/>
+          <p:cNvPr id="103" name="Google Shape;103;ge6d407e7a1_0_0"/>
           <p:cNvSpPr txBox="1">
             <a:spLocks noGrp="1"/>
           </p:cNvSpPr>
           <p:nvPr>
-            <p:ph type="subTitle" idx="1"/>
+            <p:ph type="ftr" idx="11"/>
           </p:nvPr>
         </p:nvSpPr>
         <p:spPr>
           <a:xfrm>
-            <a:off x="776802" y="3242524"/>
-            <a:ext cx="7909998" cy="776726"/>
+            <a:off x="4572000" y="6506896"/>
+            <a:ext cx="4114800" cy="365100"/>
           </a:xfrm>
           <a:prstGeom prst="rect">
             <a:avLst/>
@@ -13600,15 +13581,196 @@
           </a:ln>
         </p:spPr>
         <p:txBody>
-          <a:bodyPr spcFirstLastPara="1" wrap="square" lIns="91425" tIns="45700" rIns="91425" bIns="45700" anchor="t" anchorCtr="0">
+          <a:bodyPr spcFirstLastPara="1" wrap="square" lIns="91425" tIns="45700" rIns="91425" bIns="45700" anchor="ctr" anchorCtr="0">
             <a:noAutofit/>
           </a:bodyPr>
           <a:lstStyle/>
           <a:p>
+            <a:pPr marL="0" lvl="0" indent="0" algn="r" rtl="0">
+              <a:lnSpc>
+                <a:spcPct val="100000"/>
+              </a:lnSpc>
+              <a:spcBef>
+                <a:spcPts val="0"/>
+              </a:spcBef>
+              <a:spcAft>
+                <a:spcPts val="0"/>
+              </a:spcAft>
+              <a:buSzPts val="1400"/>
+              <a:buNone/>
+            </a:pPr>
+            <a:r>
+              <a:rPr lang="en-US"/>
+              <a:t>Reproducibility Principles</a:t>
+            </a:r>
+            <a:endParaRPr/>
+          </a:p>
+        </p:txBody>
+      </p:sp>
+      <p:sp>
+        <p:nvSpPr>
+          <p:cNvPr id="104" name="Google Shape;104;ge6d407e7a1_0_0"/>
+          <p:cNvSpPr txBox="1">
+            <a:spLocks noGrp="1"/>
+          </p:cNvSpPr>
+          <p:nvPr>
+            <p:ph type="sldNum" idx="12"/>
+          </p:nvPr>
+        </p:nvSpPr>
+        <p:spPr>
+          <a:xfrm>
+            <a:off x="8686800" y="6506896"/>
+            <a:ext cx="416100" cy="365100"/>
+          </a:xfrm>
+          <a:prstGeom prst="rect">
+            <a:avLst/>
+          </a:prstGeom>
+          <a:noFill/>
+          <a:ln>
+            <a:noFill/>
+          </a:ln>
+        </p:spPr>
+        <p:txBody>
+          <a:bodyPr spcFirstLastPara="1" wrap="square" lIns="91425" tIns="45700" rIns="91425" bIns="45700" anchor="ctr" anchorCtr="0">
+            <a:noAutofit/>
+          </a:bodyPr>
+          <a:lstStyle/>
+          <a:p>
+            <a:pPr marL="0" lvl="0" indent="0" algn="r" rtl="0">
+              <a:lnSpc>
+                <a:spcPct val="100000"/>
+              </a:lnSpc>
+              <a:spcBef>
+                <a:spcPts val="0"/>
+              </a:spcBef>
+              <a:spcAft>
+                <a:spcPts val="0"/>
+              </a:spcAft>
+              <a:buSzPts val="1000"/>
+              <a:buNone/>
+            </a:pPr>
+            <a:fld id="{00000000-1234-1234-1234-123412341234}" type="slidenum">
+              <a:rPr lang="en-US"/>
+              <a:t>1</a:t>
+            </a:fld>
+            <a:endParaRPr/>
+          </a:p>
+        </p:txBody>
+      </p:sp>
+      <p:sp>
+        <p:nvSpPr>
+          <p:cNvPr id="105" name="Google Shape;105;ge6d407e7a1_0_0"/>
+          <p:cNvSpPr txBox="1"/>
+          <p:nvPr/>
+        </p:nvSpPr>
+        <p:spPr>
+          <a:xfrm>
+            <a:off x="268574" y="866775"/>
+            <a:ext cx="8418226" cy="4062620"/>
+          </a:xfrm>
+          <a:prstGeom prst="rect">
+            <a:avLst/>
+          </a:prstGeom>
+          <a:noFill/>
+          <a:ln>
+            <a:noFill/>
+          </a:ln>
+        </p:spPr>
+        <p:txBody>
+          <a:bodyPr spcFirstLastPara="1" wrap="square" lIns="91425" tIns="91425" rIns="91425" bIns="91425" anchor="t" anchorCtr="0">
+            <a:spAutoFit/>
+          </a:bodyPr>
+          <a:lstStyle/>
+          <a:p>
+            <a:pPr lvl="0">
+              <a:buClr>
+                <a:schemeClr val="dk1"/>
+              </a:buClr>
+              <a:buSzPts val="1100"/>
+            </a:pPr>
+            <a:r>
+              <a:rPr lang="en-US" sz="1800" dirty="0">
+                <a:solidFill>
+                  <a:schemeClr val="dk1"/>
+                </a:solidFill>
+                <a:highlight>
+                  <a:srgbClr val="C0C0C0"/>
+                </a:highlight>
+                <a:latin typeface="Consolas"/>
+                <a:cs typeface="Consolas"/>
+                <a:sym typeface="Roboto Medium"/>
+              </a:rPr>
+              <a:t>conda activate </a:t>
+            </a:r>
+            <a:r>
+              <a:rPr lang="en-US" sz="1800" dirty="0" err="1">
+                <a:solidFill>
+                  <a:schemeClr val="dk1"/>
+                </a:solidFill>
+                <a:highlight>
+                  <a:srgbClr val="C0C0C0"/>
+                </a:highlight>
+                <a:latin typeface="Consolas"/>
+                <a:cs typeface="Consolas"/>
+                <a:sym typeface="Roboto Medium"/>
+              </a:rPr>
+              <a:t>edgar</a:t>
+            </a:r>
+            <a:endParaRPr lang="en-US" sz="1800" dirty="0">
+              <a:solidFill>
+                <a:schemeClr val="dk1"/>
+              </a:solidFill>
+              <a:highlight>
+                <a:srgbClr val="C0C0C0"/>
+              </a:highlight>
+              <a:latin typeface="Consolas"/>
+              <a:cs typeface="Consolas"/>
+              <a:sym typeface="Roboto Medium"/>
+            </a:endParaRPr>
+          </a:p>
+          <a:p>
+            <a:pPr lvl="0">
+              <a:buClr>
+                <a:schemeClr val="dk1"/>
+              </a:buClr>
+              <a:buSzPts val="1100"/>
+            </a:pPr>
+            <a:r>
+              <a:rPr lang="en-US" sz="1800" dirty="0">
+                <a:solidFill>
+                  <a:schemeClr val="dk1"/>
+                </a:solidFill>
+                <a:highlight>
+                  <a:srgbClr val="C0C0C0"/>
+                </a:highlight>
+                <a:latin typeface="Consolas"/>
+                <a:cs typeface="Consolas"/>
+                <a:sym typeface="Roboto Medium"/>
+              </a:rPr>
+              <a:t>edgar2data --help</a:t>
+            </a:r>
+          </a:p>
+          <a:p>
+            <a:pPr lvl="0">
+              <a:buClr>
+                <a:schemeClr val="dk1"/>
+              </a:buClr>
+              <a:buSzPts val="1100"/>
+            </a:pPr>
+            <a:endParaRPr lang="en-US" sz="1800" dirty="0">
+              <a:solidFill>
+                <a:schemeClr val="dk1"/>
+              </a:solidFill>
+              <a:highlight>
+                <a:srgbClr val="C0C0C0"/>
+              </a:highlight>
+              <a:latin typeface="Consolas"/>
+              <a:cs typeface="Consolas"/>
+              <a:sym typeface="Roboto Medium"/>
+            </a:endParaRPr>
+          </a:p>
+          <a:p>
             <a:pPr marL="0" lvl="0" indent="0" algn="l" rtl="0">
-              <a:lnSpc>
-                <a:spcPct val="100000"/>
-              </a:lnSpc>
               <a:spcBef>
                 <a:spcPts val="0"/>
               </a:spcBef>
@@ -13618,36 +13780,318 @@
               <a:buClr>
                 <a:schemeClr val="dk1"/>
               </a:buClr>
-              <a:buSzPts val="2000"/>
-              <a:buNone/>
-            </a:pPr>
-            <a:endParaRPr dirty="0"/>
-          </a:p>
-          <a:p>
-            <a:pPr marL="0" lvl="0" indent="0" algn="l" rtl="0">
-              <a:lnSpc>
-                <a:spcPct val="100000"/>
-              </a:lnSpc>
-              <a:spcBef>
-                <a:spcPts val="400"/>
-              </a:spcBef>
-              <a:spcAft>
-                <a:spcPts val="0"/>
-              </a:spcAft>
+              <a:buSzPts val="1100"/>
+              <a:buFont typeface="Arial"/>
+              <a:buNone/>
+            </a:pPr>
+            <a:r>
+              <a:rPr lang="en-US" sz="1800" dirty="0">
+                <a:solidFill>
+                  <a:schemeClr val="dk1"/>
+                </a:solidFill>
+                <a:highlight>
+                  <a:srgbClr val="C0C0C0"/>
+                </a:highlight>
+                <a:latin typeface="Consolas"/>
+                <a:cs typeface="Consolas"/>
+                <a:sym typeface="Roboto Medium"/>
+              </a:rPr>
+              <a:t>cd</a:t>
+            </a:r>
+          </a:p>
+          <a:p>
+            <a:pPr>
               <a:buClr>
                 <a:schemeClr val="dk1"/>
               </a:buClr>
-              <a:buSzPts val="2000"/>
-              <a:buNone/>
-            </a:pPr>
-            <a:r>
-              <a:rPr lang="en-US" dirty="0"/>
-              <a:t>Summer 2022</a:t>
+              <a:buSzPts val="1100"/>
+            </a:pPr>
+            <a:r>
+              <a:rPr lang="en-US" sz="1800" dirty="0">
+                <a:highlight>
+                  <a:srgbClr val="CCCCCC"/>
+                </a:highlight>
+                <a:latin typeface="Consolas"/>
+                <a:ea typeface="Consolas"/>
+                <a:cs typeface="Consolas"/>
+                <a:sym typeface="Consolas"/>
+              </a:rPr>
+              <a:t>module load git</a:t>
+            </a:r>
+            <a:endParaRPr lang="en-US" sz="1800" dirty="0">
+              <a:solidFill>
+                <a:schemeClr val="dk1"/>
+              </a:solidFill>
+              <a:highlight>
+                <a:srgbClr val="C0C0C0"/>
+              </a:highlight>
+              <a:latin typeface="Consolas"/>
+              <a:cs typeface="Consolas"/>
+              <a:sym typeface="Roboto Medium"/>
+            </a:endParaRPr>
+          </a:p>
+          <a:p>
+            <a:pPr lvl="0">
+              <a:buClr>
+                <a:schemeClr val="dk1"/>
+              </a:buClr>
+              <a:buSzPts val="1100"/>
+            </a:pPr>
+            <a:r>
+              <a:rPr lang="en-US" sz="1800" dirty="0">
+                <a:solidFill>
+                  <a:schemeClr val="dk1"/>
+                </a:solidFill>
+                <a:highlight>
+                  <a:srgbClr val="C0C0C0"/>
+                </a:highlight>
+                <a:latin typeface="Consolas"/>
+                <a:cs typeface="Consolas"/>
+                <a:sym typeface="Roboto Medium"/>
+              </a:rPr>
+              <a:t>git clone </a:t>
+            </a:r>
+            <a:r>
+              <a:rPr lang="en-US" sz="1800" dirty="0">
+                <a:solidFill>
+                  <a:schemeClr val="dk1"/>
+                </a:solidFill>
+                <a:highlight>
+                  <a:srgbClr val="C0C0C0"/>
+                </a:highlight>
+                <a:latin typeface="Consolas"/>
+                <a:cs typeface="Consolas"/>
+                <a:sym typeface="Roboto Medium"/>
+                <a:hlinkClick r:id="rId3"/>
+              </a:rPr>
+              <a:t>https://github.com/rs-kellogg/edgar2data.git</a:t>
+            </a:r>
+            <a:endParaRPr lang="en-US" sz="1800" dirty="0">
+              <a:solidFill>
+                <a:schemeClr val="dk1"/>
+              </a:solidFill>
+              <a:highlight>
+                <a:srgbClr val="C0C0C0"/>
+              </a:highlight>
+              <a:latin typeface="Consolas"/>
+              <a:cs typeface="Consolas"/>
+              <a:sym typeface="Roboto Medium"/>
+            </a:endParaRPr>
+          </a:p>
+          <a:p>
+            <a:pPr lvl="0">
+              <a:buClr>
+                <a:schemeClr val="dk1"/>
+              </a:buClr>
+              <a:buSzPts val="1100"/>
+            </a:pPr>
+            <a:r>
+              <a:rPr lang="en-US" sz="1800" dirty="0">
+                <a:solidFill>
+                  <a:schemeClr val="dk1"/>
+                </a:solidFill>
+                <a:highlight>
+                  <a:srgbClr val="C0C0C0"/>
+                </a:highlight>
+                <a:latin typeface="Consolas"/>
+                <a:cs typeface="Consolas"/>
+                <a:sym typeface="Roboto Medium"/>
+              </a:rPr>
+              <a:t>cd edgar2data</a:t>
+            </a:r>
+          </a:p>
+          <a:p>
+            <a:pPr lvl="0">
+              <a:buClr>
+                <a:schemeClr val="dk1"/>
+              </a:buClr>
+              <a:buSzPts val="1100"/>
+            </a:pPr>
+            <a:r>
+              <a:rPr lang="en-US" sz="1800" dirty="0">
+                <a:solidFill>
+                  <a:schemeClr val="dk1"/>
+                </a:solidFill>
+                <a:highlight>
+                  <a:srgbClr val="C0C0C0"/>
+                </a:highlight>
+                <a:latin typeface="Consolas"/>
+                <a:cs typeface="Consolas"/>
+                <a:sym typeface="Roboto Medium"/>
+              </a:rPr>
+              <a:t>pip install .</a:t>
+            </a:r>
+          </a:p>
+          <a:p>
+            <a:pPr lvl="0">
+              <a:buClr>
+                <a:schemeClr val="dk1"/>
+              </a:buClr>
+              <a:buSzPts val="1100"/>
+            </a:pPr>
+            <a:endParaRPr lang="en-US" sz="1800" dirty="0">
+              <a:solidFill>
+                <a:schemeClr val="dk1"/>
+              </a:solidFill>
+              <a:highlight>
+                <a:srgbClr val="C0C0C0"/>
+              </a:highlight>
+              <a:latin typeface="Consolas"/>
+              <a:cs typeface="Consolas"/>
+              <a:sym typeface="Roboto Medium"/>
+            </a:endParaRPr>
+          </a:p>
+          <a:p>
+            <a:pPr lvl="0">
+              <a:buClr>
+                <a:schemeClr val="dk1"/>
+              </a:buClr>
+              <a:buSzPts val="1100"/>
+            </a:pPr>
+            <a:r>
+              <a:rPr lang="en-US" sz="1800" dirty="0">
+                <a:solidFill>
+                  <a:schemeClr val="dk1"/>
+                </a:solidFill>
+                <a:highlight>
+                  <a:srgbClr val="C0C0C0"/>
+                </a:highlight>
+                <a:latin typeface="Consolas"/>
+                <a:cs typeface="Consolas"/>
+                <a:sym typeface="Roboto Medium"/>
+              </a:rPr>
+              <a:t>cd ~/edgar2data</a:t>
+            </a:r>
+          </a:p>
+          <a:p>
+            <a:pPr lvl="0">
+              <a:buClr>
+                <a:schemeClr val="dk1"/>
+              </a:buClr>
+              <a:buSzPts val="1100"/>
+            </a:pPr>
+            <a:r>
+              <a:rPr lang="en-US" sz="1800" dirty="0">
+                <a:solidFill>
+                  <a:schemeClr val="dk1"/>
+                </a:solidFill>
+                <a:highlight>
+                  <a:srgbClr val="C0C0C0"/>
+                </a:highlight>
+                <a:latin typeface="Consolas"/>
+                <a:cs typeface="Consolas"/>
+                <a:sym typeface="Roboto Medium"/>
+              </a:rPr>
+              <a:t>conda install </a:t>
+            </a:r>
+            <a:r>
+              <a:rPr lang="en-US" sz="1800" dirty="0" err="1">
+                <a:solidFill>
+                  <a:schemeClr val="dk1"/>
+                </a:solidFill>
+                <a:highlight>
+                  <a:srgbClr val="C0C0C0"/>
+                </a:highlight>
+                <a:latin typeface="Consolas"/>
+                <a:cs typeface="Consolas"/>
+                <a:sym typeface="Roboto Medium"/>
+              </a:rPr>
+              <a:t>pytest</a:t>
+            </a:r>
+            <a:endParaRPr lang="en-US" sz="1800" dirty="0">
+              <a:solidFill>
+                <a:schemeClr val="dk1"/>
+              </a:solidFill>
+              <a:highlight>
+                <a:srgbClr val="C0C0C0"/>
+              </a:highlight>
+              <a:latin typeface="Consolas"/>
+              <a:cs typeface="Consolas"/>
+              <a:sym typeface="Roboto Medium"/>
+            </a:endParaRPr>
+          </a:p>
+          <a:p>
+            <a:pPr lvl="0">
+              <a:buClr>
+                <a:schemeClr val="dk1"/>
+              </a:buClr>
+              <a:buSzPts val="1100"/>
+            </a:pPr>
+            <a:r>
+              <a:rPr lang="en-US" sz="1800" dirty="0" err="1">
+                <a:solidFill>
+                  <a:schemeClr val="dk1"/>
+                </a:solidFill>
+                <a:highlight>
+                  <a:srgbClr val="C0C0C0"/>
+                </a:highlight>
+                <a:latin typeface="Consolas"/>
+                <a:cs typeface="Consolas"/>
+                <a:sym typeface="Roboto Medium"/>
+              </a:rPr>
+              <a:t>pytest</a:t>
+            </a:r>
+            <a:endParaRPr lang="en-US" sz="1800" dirty="0">
+              <a:solidFill>
+                <a:schemeClr val="dk1"/>
+              </a:solidFill>
+              <a:highlight>
+                <a:srgbClr val="C0C0C0"/>
+              </a:highlight>
+              <a:latin typeface="Consolas"/>
+              <a:cs typeface="Consolas"/>
+              <a:sym typeface="Roboto Medium"/>
+            </a:endParaRPr>
+          </a:p>
+          <a:p>
+            <a:pPr lvl="0">
+              <a:buClr>
+                <a:schemeClr val="dk1"/>
+              </a:buClr>
+              <a:buSzPts val="1100"/>
+            </a:pPr>
+            <a:endParaRPr lang="en-US" sz="1800" dirty="0">
+              <a:solidFill>
+                <a:schemeClr val="dk1"/>
+              </a:solidFill>
+              <a:highlight>
+                <a:srgbClr val="C0C0C0"/>
+              </a:highlight>
+              <a:latin typeface="Consolas"/>
+              <a:cs typeface="Consolas"/>
+              <a:sym typeface="Roboto Medium"/>
+            </a:endParaRPr>
+          </a:p>
+          <a:p>
+            <a:pPr>
+              <a:buClr>
+                <a:schemeClr val="dk1"/>
+              </a:buClr>
+              <a:buSzPts val="1100"/>
+            </a:pPr>
+            <a:r>
+              <a:rPr lang="en-US" sz="1800" dirty="0">
+                <a:solidFill>
+                  <a:schemeClr val="dk1"/>
+                </a:solidFill>
+                <a:highlight>
+                  <a:srgbClr val="C0C0C0"/>
+                </a:highlight>
+                <a:latin typeface="Consolas"/>
+                <a:cs typeface="Consolas"/>
+                <a:sym typeface="Roboto Medium"/>
+              </a:rPr>
+              <a:t>cd ~/workshop_2022/</a:t>
             </a:r>
           </a:p>
         </p:txBody>
       </p:sp>
     </p:spTree>
+    <p:extLst>
+      <p:ext uri="{BB962C8B-B14F-4D97-AF65-F5344CB8AC3E}">
+        <p14:creationId xmlns:p14="http://schemas.microsoft.com/office/powerpoint/2010/main" val="2550150182"/>
+      </p:ext>
+    </p:extLst>
   </p:cSld>
   <p:clrMapOvr>
     <a:masterClrMapping/>
@@ -14232,7 +14676,7 @@
         <p:spPr>
           <a:xfrm>
             <a:off x="268574" y="904875"/>
-            <a:ext cx="8418226" cy="5170616"/>
+            <a:ext cx="8418226" cy="4062620"/>
           </a:xfrm>
           <a:prstGeom prst="rect">
             <a:avLst/>
@@ -14273,173 +14717,6 @@
             </a:endParaRPr>
           </a:p>
           <a:p>
-            <a:pPr marL="11113" lvl="2" indent="454025">
-              <a:buClr>
-                <a:schemeClr val="dk1"/>
-              </a:buClr>
-              <a:buSzPts val="1100"/>
-            </a:pPr>
-            <a:r>
-              <a:rPr lang="en-US" sz="1800" dirty="0">
-                <a:solidFill>
-                  <a:schemeClr val="dk1"/>
-                </a:solidFill>
-                <a:highlight>
-                  <a:srgbClr val="C0C0C0"/>
-                </a:highlight>
-                <a:latin typeface="Consolas"/>
-                <a:cs typeface="Consolas"/>
-                <a:sym typeface="Roboto Medium"/>
-              </a:rPr>
-              <a:t>﻿git add </a:t>
-            </a:r>
-            <a:r>
-              <a:rPr lang="en-US" sz="1800" dirty="0" err="1">
-                <a:solidFill>
-                  <a:schemeClr val="dk1"/>
-                </a:solidFill>
-                <a:highlight>
-                  <a:srgbClr val="C0C0C0"/>
-                </a:highlight>
-                <a:latin typeface="Consolas"/>
-                <a:cs typeface="Consolas"/>
-                <a:sym typeface="Roboto Medium"/>
-              </a:rPr>
-              <a:t>fec_all.sh</a:t>
-            </a:r>
-            <a:r>
-              <a:rPr lang="en-US" sz="1800" dirty="0">
-                <a:solidFill>
-                  <a:schemeClr val="dk1"/>
-                </a:solidFill>
-                <a:highlight>
-                  <a:srgbClr val="C0C0C0"/>
-                </a:highlight>
-                <a:latin typeface="Consolas"/>
-                <a:cs typeface="Consolas"/>
-                <a:sym typeface="Roboto Medium"/>
-              </a:rPr>
-              <a:t> </a:t>
-            </a:r>
-            <a:r>
-              <a:rPr lang="en-US" sz="1800" dirty="0" err="1">
-                <a:solidFill>
-                  <a:schemeClr val="dk1"/>
-                </a:solidFill>
-                <a:highlight>
-                  <a:srgbClr val="C0C0C0"/>
-                </a:highlight>
-                <a:latin typeface="Consolas"/>
-                <a:cs typeface="Consolas"/>
-                <a:sym typeface="Roboto Medium"/>
-              </a:rPr>
-              <a:t>fec_cron.sh</a:t>
-            </a:r>
-            <a:r>
-              <a:rPr lang="en-US" sz="1800" dirty="0">
-                <a:solidFill>
-                  <a:schemeClr val="dk1"/>
-                </a:solidFill>
-                <a:highlight>
-                  <a:srgbClr val="C0C0C0"/>
-                </a:highlight>
-                <a:latin typeface="Consolas"/>
-                <a:cs typeface="Consolas"/>
-                <a:sym typeface="Roboto Medium"/>
-              </a:rPr>
-              <a:t> </a:t>
-            </a:r>
-            <a:r>
-              <a:rPr lang="en-US" sz="1800" dirty="0" err="1">
-                <a:solidFill>
-                  <a:schemeClr val="dk1"/>
-                </a:solidFill>
-                <a:highlight>
-                  <a:srgbClr val="C0C0C0"/>
-                </a:highlight>
-                <a:latin typeface="Consolas"/>
-                <a:cs typeface="Consolas"/>
-                <a:sym typeface="Roboto Medium"/>
-              </a:rPr>
-              <a:t>fec_extract.py</a:t>
-            </a:r>
-            <a:r>
-              <a:rPr lang="en-US" sz="1800" dirty="0">
-                <a:solidFill>
-                  <a:schemeClr val="dk1"/>
-                </a:solidFill>
-                <a:highlight>
-                  <a:srgbClr val="C0C0C0"/>
-                </a:highlight>
-                <a:latin typeface="Consolas"/>
-                <a:cs typeface="Consolas"/>
-                <a:sym typeface="Roboto Medium"/>
-              </a:rPr>
-              <a:t> </a:t>
-            </a:r>
-            <a:r>
-              <a:rPr lang="en-US" sz="1800" dirty="0" err="1">
-                <a:solidFill>
-                  <a:schemeClr val="dk1"/>
-                </a:solidFill>
-                <a:highlight>
-                  <a:srgbClr val="C0C0C0"/>
-                </a:highlight>
-                <a:latin typeface="Consolas"/>
-                <a:cs typeface="Consolas"/>
-                <a:sym typeface="Roboto Medium"/>
-              </a:rPr>
-              <a:t>fec_process.R</a:t>
-            </a:r>
-            <a:endParaRPr lang="en-US" sz="1800" dirty="0">
-              <a:solidFill>
-                <a:schemeClr val="dk1"/>
-              </a:solidFill>
-              <a:highlight>
-                <a:srgbClr val="C0C0C0"/>
-              </a:highlight>
-              <a:latin typeface="Consolas"/>
-              <a:cs typeface="Consolas"/>
-              <a:sym typeface="Roboto Medium"/>
-            </a:endParaRPr>
-          </a:p>
-          <a:p>
-            <a:pPr lvl="0">
-              <a:buClr>
-                <a:schemeClr val="dk1"/>
-              </a:buClr>
-              <a:buSzPts val="1100"/>
-            </a:pPr>
-            <a:endParaRPr lang="en-US" sz="1800" dirty="0">
-              <a:sym typeface="Roboto Medium"/>
-            </a:endParaRPr>
-          </a:p>
-          <a:p>
-            <a:pPr lvl="0">
-              <a:buClr>
-                <a:schemeClr val="dk1"/>
-              </a:buClr>
-              <a:buSzPts val="1100"/>
-            </a:pPr>
-            <a:r>
-              <a:rPr lang="en-US" sz="1800" dirty="0">
-                <a:sym typeface="Roboto Medium"/>
-              </a:rPr>
-              <a:t>OR</a:t>
-            </a:r>
-          </a:p>
-          <a:p>
-            <a:pPr lvl="0">
-              <a:buClr>
-                <a:schemeClr val="dk1"/>
-              </a:buClr>
-              <a:buSzPts val="1100"/>
-            </a:pPr>
-            <a:endParaRPr lang="en-US" sz="1800" dirty="0">
-              <a:sym typeface="Roboto Medium"/>
-            </a:endParaRPr>
-          </a:p>
-          <a:p>
             <a:pPr lvl="0" indent="465138">
               <a:buClr>
                 <a:schemeClr val="dk1"/>
@@ -14547,7 +14824,7 @@
                 <a:cs typeface="Consolas"/>
                 <a:sym typeface="Roboto Medium"/>
               </a:rPr>
-              <a:t>﻿git commit -m "Add all FEC files to repo”</a:t>
+              <a:t>﻿git commit -m "initial commit"</a:t>
             </a:r>
           </a:p>
           <a:p>
@@ -15192,15 +15469,7 @@
             </a:pPr>
             <a:r>
               <a:rPr lang="en-US" dirty="0"/>
-              <a:t>Creating and accessing a </a:t>
-            </a:r>
-            <a:r>
-              <a:rPr lang="en-US" dirty="0" err="1"/>
-              <a:t>Github</a:t>
-            </a:r>
-            <a:r>
-              <a:rPr lang="en-US" dirty="0"/>
-              <a:t> Repo</a:t>
+              <a:t>Creating and accessing a Github Repo</a:t>
             </a:r>
             <a:endParaRPr dirty="0"/>
           </a:p>
@@ -15347,19 +15616,7 @@
               <a:rPr lang="en-US" sz="1800" dirty="0">
                 <a:sym typeface="Roboto Medium"/>
               </a:rPr>
-              <a:t>We can go to a </a:t>
-            </a:r>
-            <a:r>
-              <a:rPr lang="en-US" sz="1800" dirty="0" err="1">
-                <a:sym typeface="Roboto Medium"/>
-              </a:rPr>
-              <a:t>Github</a:t>
-            </a:r>
-            <a:r>
-              <a:rPr lang="en-US" sz="1800" dirty="0">
-                <a:sym typeface="Roboto Medium"/>
-              </a:rPr>
-              <a:t> account to create a new private repo to save our local changes. </a:t>
+              <a:t>We can go to a Github account to create a new private repo to save our local changes. </a:t>
             </a:r>
           </a:p>
         </p:txBody>
@@ -15669,31 +15926,7 @@
               <a:rPr lang="en-US" sz="1800" dirty="0">
                 <a:sym typeface="Roboto Medium"/>
               </a:rPr>
-              <a:t>The instructions should list how to add a ”remote” to your </a:t>
-            </a:r>
-            <a:r>
-              <a:rPr lang="en-US" sz="1800" dirty="0" err="1">
-                <a:sym typeface="Roboto Medium"/>
-              </a:rPr>
-              <a:t>Github</a:t>
-            </a:r>
-            <a:r>
-              <a:rPr lang="en-US" sz="1800" dirty="0">
-                <a:sym typeface="Roboto Medium"/>
-              </a:rPr>
-              <a:t> repo, which is equivalent to a label for your </a:t>
-            </a:r>
-            <a:r>
-              <a:rPr lang="en-US" sz="1800" dirty="0" err="1">
-                <a:sym typeface="Roboto Medium"/>
-              </a:rPr>
-              <a:t>Github</a:t>
-            </a:r>
-            <a:r>
-              <a:rPr lang="en-US" sz="1800" dirty="0">
-                <a:sym typeface="Roboto Medium"/>
-              </a:rPr>
-              <a:t> </a:t>
+              <a:t>The instructions should list how to add a ”remote” to your Github repo, which is equivalent to a label for your Github </a:t>
             </a:r>
             <a:r>
               <a:rPr lang="en-US" sz="1800" dirty="0" err="1">
@@ -15997,15 +16230,7 @@
             </a:pPr>
             <a:r>
               <a:rPr lang="en-US" dirty="0"/>
-              <a:t>Saving Changes to a </a:t>
-            </a:r>
-            <a:r>
-              <a:rPr lang="en-US" dirty="0" err="1"/>
-              <a:t>Github</a:t>
-            </a:r>
-            <a:r>
-              <a:rPr lang="en-US" dirty="0"/>
-              <a:t> repo</a:t>
+              <a:t>Saving Changes to a Github repo</a:t>
             </a:r>
             <a:endParaRPr dirty="0"/>
           </a:p>
@@ -16232,11 +16457,7 @@
             </a:pPr>
             <a:r>
               <a:rPr lang="en-US" dirty="0"/>
-              <a:t>Saving local Git repo to </a:t>
-            </a:r>
-            <a:r>
-              <a:rPr lang="en-US" dirty="0" err="1"/>
-              <a:t>Github</a:t>
+              <a:t>Saving local Git repo to Github</a:t>
             </a:r>
             <a:endParaRPr dirty="0"/>
           </a:p>
@@ -16383,19 +16604,7 @@
               <a:rPr lang="en-US" sz="1800" dirty="0">
                 <a:sym typeface="Roboto Medium"/>
               </a:rPr>
-              <a:t>To push the changes in your local repo to </a:t>
-            </a:r>
-            <a:r>
-              <a:rPr lang="en-US" sz="1800" dirty="0" err="1">
-                <a:sym typeface="Roboto Medium"/>
-              </a:rPr>
-              <a:t>Github</a:t>
-            </a:r>
-            <a:r>
-              <a:rPr lang="en-US" sz="1800" dirty="0">
-                <a:sym typeface="Roboto Medium"/>
-              </a:rPr>
-              <a:t>, do the following: </a:t>
+              <a:t>To push the changes in your local repo to Github, do the following: </a:t>
             </a:r>
           </a:p>
           <a:p>
@@ -16481,19 +16690,7 @@
               <a:rPr lang="en-US" sz="1800" dirty="0">
                 <a:sym typeface="Roboto Medium"/>
               </a:rPr>
-              <a:t>The push request will require you to sign into your </a:t>
-            </a:r>
-            <a:r>
-              <a:rPr lang="en-US" sz="1800" dirty="0" err="1">
-                <a:sym typeface="Roboto Medium"/>
-              </a:rPr>
-              <a:t>Github</a:t>
-            </a:r>
-            <a:r>
-              <a:rPr lang="en-US" sz="1800" dirty="0">
-                <a:sym typeface="Roboto Medium"/>
-              </a:rPr>
-              <a:t> account on KLC.  In order to do so you will need a </a:t>
+              <a:t>The push request will require you to sign into your Github account on KLC.  In order to do so you will need a </a:t>
             </a:r>
             <a:r>
               <a:rPr lang="en-US" sz="1800" b="1" dirty="0">
@@ -16707,15 +16904,7 @@
             </a:pPr>
             <a:r>
               <a:rPr lang="en-US" dirty="0"/>
-              <a:t>Saving </a:t>
-            </a:r>
-            <a:r>
-              <a:rPr lang="en-US" dirty="0" err="1"/>
-              <a:t>Github</a:t>
-            </a:r>
-            <a:r>
-              <a:rPr lang="en-US" dirty="0"/>
-              <a:t> changes to local repo</a:t>
+              <a:t>Saving Github changes to local repo</a:t>
             </a:r>
             <a:endParaRPr dirty="0"/>
           </a:p>
@@ -16862,19 +17051,7 @@
               <a:rPr lang="en-US" sz="1800" dirty="0">
                 <a:sym typeface="Roboto Medium"/>
               </a:rPr>
-              <a:t>If you manually add files or make other changes on </a:t>
-            </a:r>
-            <a:r>
-              <a:rPr lang="en-US" sz="1800" dirty="0" err="1">
-                <a:sym typeface="Roboto Medium"/>
-              </a:rPr>
-              <a:t>Github</a:t>
-            </a:r>
-            <a:r>
-              <a:rPr lang="en-US" sz="1800" dirty="0">
-                <a:sym typeface="Roboto Medium"/>
-              </a:rPr>
-              <a:t>, you can sync those changes to your local git repo on KLC by doing the following: </a:t>
+              <a:t>If you manually add files or make other changes on Github, you can sync those changes to your local git repo on KLC by doing the following: </a:t>
             </a:r>
           </a:p>
           <a:p>
@@ -17003,15 +17180,7 @@
             </a:pPr>
             <a:r>
               <a:rPr lang="en-US" dirty="0"/>
-              <a:t>Discussion: Using Git and </a:t>
-            </a:r>
-            <a:r>
-              <a:rPr lang="en-US" dirty="0" err="1"/>
-              <a:t>Github</a:t>
-            </a:r>
-            <a:r>
-              <a:rPr lang="en-US" dirty="0"/>
-              <a:t> Smartly</a:t>
+              <a:t>Discussion: Using Git and Github Smartly</a:t>
             </a:r>
             <a:endParaRPr dirty="0"/>
           </a:p>
@@ -17221,15 +17390,7 @@
             </a:pPr>
             <a:r>
               <a:rPr lang="en-US" dirty="0"/>
-              <a:t>Discussion: Using Git and </a:t>
-            </a:r>
-            <a:r>
-              <a:rPr lang="en-US" dirty="0" err="1"/>
-              <a:t>Github</a:t>
-            </a:r>
-            <a:r>
-              <a:rPr lang="en-US" dirty="0"/>
-              <a:t> Smartly</a:t>
+              <a:t>Discussion: Using Git and Github Smartly</a:t>
             </a:r>
             <a:endParaRPr dirty="0"/>
           </a:p>
@@ -17376,19 +17537,7 @@
               <a:rPr lang="en-US" sz="1800" dirty="0">
                 <a:sym typeface="Roboto Medium"/>
               </a:rPr>
-              <a:t>Git tools are not a substitute for good documentation.  You are still responsible for making decisions about whether the code is tested, what version is saved, how descriptive the comments are.  Placing bad code in Git/</a:t>
-            </a:r>
-            <a:r>
-              <a:rPr lang="en-US" sz="1800" dirty="0" err="1">
-                <a:sym typeface="Roboto Medium"/>
-              </a:rPr>
-              <a:t>Github</a:t>
-            </a:r>
-            <a:r>
-              <a:rPr lang="en-US" sz="1800" dirty="0">
-                <a:sym typeface="Roboto Medium"/>
-              </a:rPr>
-              <a:t> is still bad code!</a:t>
+              <a:t>Git tools are not a substitute for good documentation.  You are still responsible for making decisions about whether the code is tested, what version is saved, how descriptive the comments are.  Placing bad code in Git/Github is still bad code!</a:t>
             </a:r>
           </a:p>
           <a:p>
@@ -17452,7 +17601,7 @@
   <p:cSld>
     <p:spTree>
       <p:nvGrpSpPr>
-        <p:cNvPr id="1" name="Shape 55"/>
+        <p:cNvPr id="1" name="Shape 48"/>
         <p:cNvGrpSpPr/>
         <p:nvPr/>
       </p:nvGrpSpPr>
@@ -17466,18 +17615,18 @@
       </p:grpSpPr>
       <p:sp>
         <p:nvSpPr>
-          <p:cNvPr id="56" name="Google Shape;56;p2"/>
+          <p:cNvPr id="49" name="Google Shape;49;p1"/>
           <p:cNvSpPr txBox="1">
             <a:spLocks noGrp="1"/>
           </p:cNvSpPr>
           <p:nvPr>
-            <p:ph type="title"/>
+            <p:ph type="ctrTitle"/>
           </p:nvPr>
         </p:nvSpPr>
         <p:spPr>
           <a:xfrm>
-            <a:off x="457200" y="0"/>
-            <a:ext cx="8229600" cy="1143000"/>
+            <a:off x="233680" y="665766"/>
+            <a:ext cx="8910320" cy="2149314"/>
           </a:xfrm>
           <a:prstGeom prst="rect">
             <a:avLst/>
@@ -17488,7 +17637,7 @@
           </a:ln>
         </p:spPr>
         <p:txBody>
-          <a:bodyPr spcFirstLastPara="1" wrap="square" lIns="91425" tIns="45700" rIns="91425" bIns="45700" anchor="ctr" anchorCtr="0">
+          <a:bodyPr spcFirstLastPara="1" wrap="square" lIns="91425" tIns="45700" rIns="91425" bIns="45700" anchor="b" anchorCtr="0">
             <a:noAutofit/>
           </a:bodyPr>
           <a:lstStyle/>
@@ -17506,13 +17655,20 @@
               <a:buClr>
                 <a:srgbClr val="3D146F"/>
               </a:buClr>
-              <a:buSzPts val="3200"/>
+              <a:buSzPts val="4500"/>
               <a:buFont typeface="Arial"/>
               <a:buNone/>
             </a:pPr>
             <a:r>
               <a:rPr lang="en-US" dirty="0"/>
-              <a:t>Version Control without Git</a:t>
+              <a:t>Using Git and Github on KLC</a:t>
+            </a:r>
+            <a:br>
+              <a:rPr lang="en-US" dirty="0"/>
+            </a:br>
+            <a:r>
+              <a:rPr lang="en-US" sz="2400" dirty="0"/>
+              <a:t>Fellows Workshop</a:t>
             </a:r>
             <a:endParaRPr dirty="0"/>
           </a:p>
@@ -17520,18 +17676,18 @@
       </p:sp>
       <p:sp>
         <p:nvSpPr>
-          <p:cNvPr id="57" name="Google Shape;57;p2"/>
+          <p:cNvPr id="50" name="Google Shape;50;p1"/>
           <p:cNvSpPr txBox="1">
             <a:spLocks noGrp="1"/>
           </p:cNvSpPr>
           <p:nvPr>
-            <p:ph type="ftr" idx="11"/>
+            <p:ph type="subTitle" idx="1"/>
           </p:nvPr>
         </p:nvSpPr>
         <p:spPr>
           <a:xfrm>
-            <a:off x="4572000" y="6506896"/>
-            <a:ext cx="4114800" cy="365100"/>
+            <a:off x="776802" y="3242524"/>
+            <a:ext cx="7909998" cy="776726"/>
           </a:xfrm>
           <a:prstGeom prst="rect">
             <a:avLst/>
@@ -17542,180 +17698,54 @@
           </a:ln>
         </p:spPr>
         <p:txBody>
-          <a:bodyPr spcFirstLastPara="1" wrap="square" lIns="91425" tIns="45700" rIns="91425" bIns="45700" anchor="ctr" anchorCtr="0">
+          <a:bodyPr spcFirstLastPara="1" wrap="square" lIns="91425" tIns="45700" rIns="91425" bIns="45700" anchor="t" anchorCtr="0">
             <a:noAutofit/>
           </a:bodyPr>
           <a:lstStyle/>
           <a:p>
-            <a:pPr marL="0" lvl="0" indent="0" algn="r" rtl="0">
-              <a:lnSpc>
-                <a:spcPct val="100000"/>
-              </a:lnSpc>
-              <a:spcBef>
-                <a:spcPts val="0"/>
-              </a:spcBef>
-              <a:spcAft>
-                <a:spcPts val="0"/>
-              </a:spcAft>
-              <a:buSzPts val="1400"/>
-              <a:buNone/>
-            </a:pPr>
-            <a:r>
-              <a:rPr lang="en-US"/>
-              <a:t>Reproducibility Principles</a:t>
-            </a:r>
-            <a:endParaRPr/>
-          </a:p>
-        </p:txBody>
-      </p:sp>
-      <p:sp>
-        <p:nvSpPr>
-          <p:cNvPr id="58" name="Google Shape;58;p2"/>
-          <p:cNvSpPr txBox="1">
-            <a:spLocks noGrp="1"/>
-          </p:cNvSpPr>
-          <p:nvPr>
-            <p:ph type="sldNum" idx="12"/>
-          </p:nvPr>
-        </p:nvSpPr>
-        <p:spPr>
-          <a:xfrm>
-            <a:off x="8686800" y="6506896"/>
-            <a:ext cx="416244" cy="365125"/>
-          </a:xfrm>
-          <a:prstGeom prst="rect">
-            <a:avLst/>
-          </a:prstGeom>
-          <a:noFill/>
-          <a:ln>
-            <a:noFill/>
-          </a:ln>
-        </p:spPr>
-        <p:txBody>
-          <a:bodyPr spcFirstLastPara="1" wrap="square" lIns="91425" tIns="45700" rIns="91425" bIns="45700" anchor="ctr" anchorCtr="0">
-            <a:noAutofit/>
-          </a:bodyPr>
-          <a:lstStyle/>
-          <a:p>
-            <a:pPr marL="0" lvl="0" indent="0" algn="r" rtl="0">
-              <a:lnSpc>
-                <a:spcPct val="100000"/>
-              </a:lnSpc>
-              <a:spcBef>
-                <a:spcPts val="0"/>
-              </a:spcBef>
-              <a:spcAft>
-                <a:spcPts val="0"/>
-              </a:spcAft>
-              <a:buSzPts val="1000"/>
-              <a:buNone/>
-            </a:pPr>
-            <a:fld id="{00000000-1234-1234-1234-123412341234}" type="slidenum">
-              <a:rPr lang="en-US"/>
-              <a:t>2</a:t>
-            </a:fld>
-            <a:endParaRPr/>
-          </a:p>
-        </p:txBody>
-      </p:sp>
-      <p:pic>
-        <p:nvPicPr>
-          <p:cNvPr id="2050" name="Picture 2" descr="Introduction to Version Control">
-            <a:extLst>
-              <a:ext uri="{FF2B5EF4-FFF2-40B4-BE49-F238E27FC236}">
-                <a16:creationId xmlns:a16="http://schemas.microsoft.com/office/drawing/2014/main" id="{7FD83F4C-E8B6-8245-A98D-C1DF43151C23}"/>
-              </a:ext>
-            </a:extLst>
-          </p:cNvPr>
-          <p:cNvPicPr>
-            <a:picLocks noChangeAspect="1" noChangeArrowheads="1"/>
-          </p:cNvPicPr>
-          <p:nvPr/>
-        </p:nvPicPr>
-        <p:blipFill>
-          <a:blip r:embed="rId3">
-            <a:extLst>
-              <a:ext uri="{28A0092B-C50C-407E-A947-70E740481C1C}">
-                <a14:useLocalDpi xmlns:a14="http://schemas.microsoft.com/office/drawing/2010/main" val="0"/>
-              </a:ext>
-            </a:extLst>
-          </a:blip>
-          <a:srcRect/>
-          <a:stretch>
-            <a:fillRect/>
-          </a:stretch>
-        </p:blipFill>
-        <p:spPr bwMode="auto">
-          <a:xfrm>
-            <a:off x="2564397" y="876299"/>
-            <a:ext cx="3582403" cy="4776537"/>
-          </a:xfrm>
-          <a:prstGeom prst="rect">
-            <a:avLst/>
-          </a:prstGeom>
-          <a:noFill/>
-          <a:extLst>
-            <a:ext uri="{909E8E84-426E-40DD-AFC4-6F175D3DCCD1}">
-              <a14:hiddenFill xmlns:a14="http://schemas.microsoft.com/office/drawing/2010/main">
-                <a:solidFill>
-                  <a:srgbClr val="FFFFFF"/>
-                </a:solidFill>
-              </a14:hiddenFill>
-            </a:ext>
-          </a:extLst>
-        </p:spPr>
-      </p:pic>
-      <p:sp>
-        <p:nvSpPr>
-          <p:cNvPr id="6" name="TextBox 5">
-            <a:extLst>
-              <a:ext uri="{FF2B5EF4-FFF2-40B4-BE49-F238E27FC236}">
-                <a16:creationId xmlns:a16="http://schemas.microsoft.com/office/drawing/2014/main" id="{131CF950-8002-E945-9262-374C441BBD91}"/>
-              </a:ext>
-            </a:extLst>
-          </p:cNvPr>
-          <p:cNvSpPr txBox="1"/>
-          <p:nvPr/>
-        </p:nvSpPr>
-        <p:spPr>
-          <a:xfrm>
-            <a:off x="1920204" y="5862478"/>
-            <a:ext cx="6604693" cy="307777"/>
-          </a:xfrm>
-          <a:prstGeom prst="rect">
-            <a:avLst/>
-          </a:prstGeom>
-          <a:noFill/>
-        </p:spPr>
-        <p:txBody>
-          <a:bodyPr wrap="none" rtlCol="0">
-            <a:spAutoFit/>
-          </a:bodyPr>
-          <a:lstStyle/>
-          <a:p>
-            <a:r>
-              <a:rPr lang="en-US" i="1" dirty="0"/>
-              <a:t>Image taken from: </a:t>
-            </a:r>
-            <a:r>
-              <a:rPr lang="en-US" i="1" dirty="0">
-                <a:hlinkClick r:id="rId4"/>
-              </a:rPr>
-              <a:t>http://phdcomics.com/comics/archive_print.php?comicid=1531</a:t>
-            </a:r>
-            <a:r>
-              <a:rPr lang="en-US" i="1" dirty="0"/>
-              <a:t> </a:t>
+            <a:pPr marL="0" lvl="0" indent="0" algn="l" rtl="0">
+              <a:lnSpc>
+                <a:spcPct val="100000"/>
+              </a:lnSpc>
+              <a:spcBef>
+                <a:spcPts val="0"/>
+              </a:spcBef>
+              <a:spcAft>
+                <a:spcPts val="0"/>
+              </a:spcAft>
+              <a:buClr>
+                <a:schemeClr val="dk1"/>
+              </a:buClr>
+              <a:buSzPts val="2000"/>
+              <a:buNone/>
+            </a:pPr>
+            <a:endParaRPr dirty="0"/>
+          </a:p>
+          <a:p>
+            <a:pPr marL="0" lvl="0" indent="0" algn="l" rtl="0">
+              <a:lnSpc>
+                <a:spcPct val="100000"/>
+              </a:lnSpc>
+              <a:spcBef>
+                <a:spcPts val="400"/>
+              </a:spcBef>
+              <a:spcAft>
+                <a:spcPts val="0"/>
+              </a:spcAft>
+              <a:buClr>
+                <a:schemeClr val="dk1"/>
+              </a:buClr>
+              <a:buSzPts val="2000"/>
+              <a:buNone/>
+            </a:pPr>
+            <a:r>
+              <a:rPr lang="en-US" dirty="0"/>
+              <a:t>Summer 2022</a:t>
             </a:r>
           </a:p>
         </p:txBody>
       </p:sp>
     </p:spTree>
-    <p:extLst>
-      <p:ext uri="{BB962C8B-B14F-4D97-AF65-F5344CB8AC3E}">
-        <p14:creationId xmlns:p14="http://schemas.microsoft.com/office/powerpoint/2010/main" val="3226329107"/>
-      </p:ext>
-    </p:extLst>
   </p:cSld>
   <p:clrMapOvr>
     <a:masterClrMapping/>
@@ -18225,15 +18255,7 @@
             </a:pPr>
             <a:r>
               <a:rPr lang="en-US" dirty="0"/>
-              <a:t>Appendix – Forking a </a:t>
-            </a:r>
-            <a:r>
-              <a:rPr lang="en-US" dirty="0" err="1"/>
-              <a:t>Github</a:t>
-            </a:r>
-            <a:r>
-              <a:rPr lang="en-US" dirty="0"/>
-              <a:t> Repo</a:t>
+              <a:t>Appendix – Forking a Github Repo</a:t>
             </a:r>
             <a:endParaRPr dirty="0"/>
           </a:p>
@@ -18380,19 +18402,7 @@
               <a:rPr lang="en-US" sz="1800" dirty="0">
                 <a:sym typeface="Roboto Medium"/>
               </a:rPr>
-              <a:t>Much like cloning, forking enables a user to copy all the contents of a </a:t>
-            </a:r>
-            <a:r>
-              <a:rPr lang="en-US" sz="1800" dirty="0" err="1">
-                <a:sym typeface="Roboto Medium"/>
-              </a:rPr>
-              <a:t>Github</a:t>
-            </a:r>
-            <a:r>
-              <a:rPr lang="en-US" sz="1800" dirty="0">
-                <a:sym typeface="Roboto Medium"/>
-              </a:rPr>
-              <a:t> repository.  However, forking a repo also enables a user to suggest and possibly implement changes to the original repository with the creator’s approval. Forking is a useful tool to collaborate with others to improve open-source code.   </a:t>
+              <a:t>Much like cloning, forking enables a user to copy all the contents of a Github repository.  However, forking a repo also enables a user to suggest and possibly implement changes to the original repository with the creator’s approval. Forking is a useful tool to collaborate with others to improve open-source code.   </a:t>
             </a:r>
           </a:p>
           <a:p>
@@ -18420,19 +18430,7 @@
               <a:rPr lang="en-US" sz="1800" dirty="0">
                 <a:sym typeface="Roboto Medium"/>
               </a:rPr>
-              <a:t>There is no command line tool in the Git module on KLC to fork a repository. Instead, navigate to the main page of a repository. On the right side, select the “Fork” button.  The selected repository will be copied to your list of </a:t>
-            </a:r>
-            <a:r>
-              <a:rPr lang="en-US" sz="1800" dirty="0" err="1">
-                <a:sym typeface="Roboto Medium"/>
-              </a:rPr>
-              <a:t>Github</a:t>
-            </a:r>
-            <a:r>
-              <a:rPr lang="en-US" sz="1800" dirty="0">
-                <a:sym typeface="Roboto Medium"/>
-              </a:rPr>
-              <a:t> repos.</a:t>
+              <a:t>There is no command line tool in the Git module on KLC to fork a repository. Instead, navigate to the main page of a repository. On the right side, select the “Fork” button.  The selected repository will be copied to your list of Github repos.</a:t>
             </a:r>
           </a:p>
           <a:p>
@@ -18592,6 +18590,282 @@
   <p:cSld>
     <p:spTree>
       <p:nvGrpSpPr>
+        <p:cNvPr id="1" name="Shape 55"/>
+        <p:cNvGrpSpPr/>
+        <p:nvPr/>
+      </p:nvGrpSpPr>
+      <p:grpSpPr>
+        <a:xfrm>
+          <a:off x="0" y="0"/>
+          <a:ext cx="0" cy="0"/>
+          <a:chOff x="0" y="0"/>
+          <a:chExt cx="0" cy="0"/>
+        </a:xfrm>
+      </p:grpSpPr>
+      <p:sp>
+        <p:nvSpPr>
+          <p:cNvPr id="56" name="Google Shape;56;p2"/>
+          <p:cNvSpPr txBox="1">
+            <a:spLocks noGrp="1"/>
+          </p:cNvSpPr>
+          <p:nvPr>
+            <p:ph type="title"/>
+          </p:nvPr>
+        </p:nvSpPr>
+        <p:spPr>
+          <a:xfrm>
+            <a:off x="457200" y="0"/>
+            <a:ext cx="8229600" cy="1143000"/>
+          </a:xfrm>
+          <a:prstGeom prst="rect">
+            <a:avLst/>
+          </a:prstGeom>
+          <a:noFill/>
+          <a:ln>
+            <a:noFill/>
+          </a:ln>
+        </p:spPr>
+        <p:txBody>
+          <a:bodyPr spcFirstLastPara="1" wrap="square" lIns="91425" tIns="45700" rIns="91425" bIns="45700" anchor="ctr" anchorCtr="0">
+            <a:noAutofit/>
+          </a:bodyPr>
+          <a:lstStyle/>
+          <a:p>
+            <a:pPr marL="0" lvl="0" indent="0" algn="l" rtl="0">
+              <a:lnSpc>
+                <a:spcPct val="100000"/>
+              </a:lnSpc>
+              <a:spcBef>
+                <a:spcPts val="0"/>
+              </a:spcBef>
+              <a:spcAft>
+                <a:spcPts val="0"/>
+              </a:spcAft>
+              <a:buClr>
+                <a:srgbClr val="3D146F"/>
+              </a:buClr>
+              <a:buSzPts val="3200"/>
+              <a:buFont typeface="Arial"/>
+              <a:buNone/>
+            </a:pPr>
+            <a:r>
+              <a:rPr lang="en-US" dirty="0"/>
+              <a:t>Version Control without Git</a:t>
+            </a:r>
+            <a:endParaRPr dirty="0"/>
+          </a:p>
+        </p:txBody>
+      </p:sp>
+      <p:sp>
+        <p:nvSpPr>
+          <p:cNvPr id="57" name="Google Shape;57;p2"/>
+          <p:cNvSpPr txBox="1">
+            <a:spLocks noGrp="1"/>
+          </p:cNvSpPr>
+          <p:nvPr>
+            <p:ph type="ftr" idx="11"/>
+          </p:nvPr>
+        </p:nvSpPr>
+        <p:spPr>
+          <a:xfrm>
+            <a:off x="4572000" y="6506896"/>
+            <a:ext cx="4114800" cy="365100"/>
+          </a:xfrm>
+          <a:prstGeom prst="rect">
+            <a:avLst/>
+          </a:prstGeom>
+          <a:noFill/>
+          <a:ln>
+            <a:noFill/>
+          </a:ln>
+        </p:spPr>
+        <p:txBody>
+          <a:bodyPr spcFirstLastPara="1" wrap="square" lIns="91425" tIns="45700" rIns="91425" bIns="45700" anchor="ctr" anchorCtr="0">
+            <a:noAutofit/>
+          </a:bodyPr>
+          <a:lstStyle/>
+          <a:p>
+            <a:pPr marL="0" lvl="0" indent="0" algn="r" rtl="0">
+              <a:lnSpc>
+                <a:spcPct val="100000"/>
+              </a:lnSpc>
+              <a:spcBef>
+                <a:spcPts val="0"/>
+              </a:spcBef>
+              <a:spcAft>
+                <a:spcPts val="0"/>
+              </a:spcAft>
+              <a:buSzPts val="1400"/>
+              <a:buNone/>
+            </a:pPr>
+            <a:r>
+              <a:rPr lang="en-US"/>
+              <a:t>Reproducibility Principles</a:t>
+            </a:r>
+            <a:endParaRPr/>
+          </a:p>
+        </p:txBody>
+      </p:sp>
+      <p:sp>
+        <p:nvSpPr>
+          <p:cNvPr id="58" name="Google Shape;58;p2"/>
+          <p:cNvSpPr txBox="1">
+            <a:spLocks noGrp="1"/>
+          </p:cNvSpPr>
+          <p:nvPr>
+            <p:ph type="sldNum" idx="12"/>
+          </p:nvPr>
+        </p:nvSpPr>
+        <p:spPr>
+          <a:xfrm>
+            <a:off x="8686800" y="6506896"/>
+            <a:ext cx="416244" cy="365125"/>
+          </a:xfrm>
+          <a:prstGeom prst="rect">
+            <a:avLst/>
+          </a:prstGeom>
+          <a:noFill/>
+          <a:ln>
+            <a:noFill/>
+          </a:ln>
+        </p:spPr>
+        <p:txBody>
+          <a:bodyPr spcFirstLastPara="1" wrap="square" lIns="91425" tIns="45700" rIns="91425" bIns="45700" anchor="ctr" anchorCtr="0">
+            <a:noAutofit/>
+          </a:bodyPr>
+          <a:lstStyle/>
+          <a:p>
+            <a:pPr marL="0" lvl="0" indent="0" algn="r" rtl="0">
+              <a:lnSpc>
+                <a:spcPct val="100000"/>
+              </a:lnSpc>
+              <a:spcBef>
+                <a:spcPts val="0"/>
+              </a:spcBef>
+              <a:spcAft>
+                <a:spcPts val="0"/>
+              </a:spcAft>
+              <a:buSzPts val="1000"/>
+              <a:buNone/>
+            </a:pPr>
+            <a:fld id="{00000000-1234-1234-1234-123412341234}" type="slidenum">
+              <a:rPr lang="en-US"/>
+              <a:t>3</a:t>
+            </a:fld>
+            <a:endParaRPr/>
+          </a:p>
+        </p:txBody>
+      </p:sp>
+      <p:pic>
+        <p:nvPicPr>
+          <p:cNvPr id="2050" name="Picture 2" descr="Introduction to Version Control">
+            <a:extLst>
+              <a:ext uri="{FF2B5EF4-FFF2-40B4-BE49-F238E27FC236}">
+                <a16:creationId xmlns:a16="http://schemas.microsoft.com/office/drawing/2014/main" id="{7FD83F4C-E8B6-8245-A98D-C1DF43151C23}"/>
+              </a:ext>
+            </a:extLst>
+          </p:cNvPr>
+          <p:cNvPicPr>
+            <a:picLocks noChangeAspect="1" noChangeArrowheads="1"/>
+          </p:cNvPicPr>
+          <p:nvPr/>
+        </p:nvPicPr>
+        <p:blipFill>
+          <a:blip r:embed="rId3">
+            <a:extLst>
+              <a:ext uri="{28A0092B-C50C-407E-A947-70E740481C1C}">
+                <a14:useLocalDpi xmlns:a14="http://schemas.microsoft.com/office/drawing/2010/main" val="0"/>
+              </a:ext>
+            </a:extLst>
+          </a:blip>
+          <a:srcRect/>
+          <a:stretch>
+            <a:fillRect/>
+          </a:stretch>
+        </p:blipFill>
+        <p:spPr bwMode="auto">
+          <a:xfrm>
+            <a:off x="2564397" y="876299"/>
+            <a:ext cx="3582403" cy="4776537"/>
+          </a:xfrm>
+          <a:prstGeom prst="rect">
+            <a:avLst/>
+          </a:prstGeom>
+          <a:noFill/>
+          <a:extLst>
+            <a:ext uri="{909E8E84-426E-40DD-AFC4-6F175D3DCCD1}">
+              <a14:hiddenFill xmlns:a14="http://schemas.microsoft.com/office/drawing/2010/main">
+                <a:solidFill>
+                  <a:srgbClr val="FFFFFF"/>
+                </a:solidFill>
+              </a14:hiddenFill>
+            </a:ext>
+          </a:extLst>
+        </p:spPr>
+      </p:pic>
+      <p:sp>
+        <p:nvSpPr>
+          <p:cNvPr id="6" name="TextBox 5">
+            <a:extLst>
+              <a:ext uri="{FF2B5EF4-FFF2-40B4-BE49-F238E27FC236}">
+                <a16:creationId xmlns:a16="http://schemas.microsoft.com/office/drawing/2014/main" id="{131CF950-8002-E945-9262-374C441BBD91}"/>
+              </a:ext>
+            </a:extLst>
+          </p:cNvPr>
+          <p:cNvSpPr txBox="1"/>
+          <p:nvPr/>
+        </p:nvSpPr>
+        <p:spPr>
+          <a:xfrm>
+            <a:off x="1920204" y="5862478"/>
+            <a:ext cx="6604693" cy="307777"/>
+          </a:xfrm>
+          <a:prstGeom prst="rect">
+            <a:avLst/>
+          </a:prstGeom>
+          <a:noFill/>
+        </p:spPr>
+        <p:txBody>
+          <a:bodyPr wrap="none" rtlCol="0">
+            <a:spAutoFit/>
+          </a:bodyPr>
+          <a:lstStyle/>
+          <a:p>
+            <a:r>
+              <a:rPr lang="en-US" i="1" dirty="0"/>
+              <a:t>Image taken from: </a:t>
+            </a:r>
+            <a:r>
+              <a:rPr lang="en-US" i="1" dirty="0">
+                <a:hlinkClick r:id="rId4"/>
+              </a:rPr>
+              <a:t>http://phdcomics.com/comics/archive_print.php?comicid=1531</a:t>
+            </a:r>
+            <a:r>
+              <a:rPr lang="en-US" i="1" dirty="0"/>
+              <a:t> </a:t>
+            </a:r>
+          </a:p>
+        </p:txBody>
+      </p:sp>
+    </p:spTree>
+    <p:extLst>
+      <p:ext uri="{BB962C8B-B14F-4D97-AF65-F5344CB8AC3E}">
+        <p14:creationId xmlns:p14="http://schemas.microsoft.com/office/powerpoint/2010/main" val="3226329107"/>
+      </p:ext>
+    </p:extLst>
+  </p:cSld>
+  <p:clrMapOvr>
+    <a:masterClrMapping/>
+  </p:clrMapOvr>
+</p:sld>
+</file>
+
+<file path=ppt/slides/slide4.xml><?xml version="1.0" encoding="utf-8"?>
+<p:sld xmlns:a="http://schemas.openxmlformats.org/drawingml/2006/main" xmlns:r="http://schemas.openxmlformats.org/officeDocument/2006/relationships" xmlns:p="http://schemas.openxmlformats.org/presentationml/2006/main">
+  <p:cSld>
+    <p:spTree>
+      <p:nvGrpSpPr>
         <p:cNvPr id="1" name="Shape 92"/>
         <p:cNvGrpSpPr/>
         <p:nvPr/>
@@ -18752,7 +19026,7 @@
             </a:pPr>
             <a:fld id="{00000000-1234-1234-1234-123412341234}" type="slidenum">
               <a:rPr lang="en-US"/>
-              <a:t>3</a:t>
+              <a:t>4</a:t>
             </a:fld>
             <a:endParaRPr/>
           </a:p>
@@ -18828,13 +19102,8 @@
             </a:pPr>
             <a:r>
               <a:rPr lang="en-US" sz="2500" dirty="0"/>
-              <a:t>The difference between Git and </a:t>
-            </a:r>
-            <a:r>
-              <a:rPr lang="en-US" sz="2500" dirty="0" err="1"/>
-              <a:t>Github</a:t>
-            </a:r>
-            <a:endParaRPr lang="en-US" sz="2500" dirty="0"/>
+              <a:t>The difference between Git and Github</a:t>
+            </a:r>
           </a:p>
           <a:p>
             <a:pPr marL="69850" marR="0" lvl="0" algn="l" rtl="0">
@@ -18901,15 +19170,7 @@
             </a:pPr>
             <a:r>
               <a:rPr lang="en-US" sz="2500" dirty="0"/>
-              <a:t>Syncing your local Git directory to a </a:t>
-            </a:r>
-            <a:r>
-              <a:rPr lang="en-US" sz="2500" dirty="0" err="1"/>
-              <a:t>Github</a:t>
-            </a:r>
-            <a:r>
-              <a:rPr lang="en-US" sz="2500" dirty="0"/>
-              <a:t> repository</a:t>
+              <a:t>Syncing your local Git directory to a Github repository</a:t>
             </a:r>
           </a:p>
           <a:p>
@@ -18943,15 +19204,7 @@
             </a:pPr>
             <a:r>
               <a:rPr lang="en-US" sz="2500" dirty="0"/>
-              <a:t>Discussion: Using Git and </a:t>
-            </a:r>
-            <a:r>
-              <a:rPr lang="en-US" sz="2500" dirty="0" err="1"/>
-              <a:t>Github</a:t>
-            </a:r>
-            <a:r>
-              <a:rPr lang="en-US" sz="2500" dirty="0"/>
-              <a:t> Smartly</a:t>
+              <a:t>Discussion: Using Git and Github Smartly</a:t>
             </a:r>
             <a:endParaRPr sz="2500" dirty="0"/>
           </a:p>
@@ -19052,665 +19305,6 @@
 </p:sld>
 </file>
 
-<file path=ppt/slides/slide4.xml><?xml version="1.0" encoding="utf-8"?>
-<p:sld xmlns:a="http://schemas.openxmlformats.org/drawingml/2006/main" xmlns:r="http://schemas.openxmlformats.org/officeDocument/2006/relationships" xmlns:p="http://schemas.openxmlformats.org/presentationml/2006/main">
-  <p:cSld>
-    <p:spTree>
-      <p:nvGrpSpPr>
-        <p:cNvPr id="1" name="Shape 101"/>
-        <p:cNvGrpSpPr/>
-        <p:nvPr/>
-      </p:nvGrpSpPr>
-      <p:grpSpPr>
-        <a:xfrm>
-          <a:off x="0" y="0"/>
-          <a:ext cx="0" cy="0"/>
-          <a:chOff x="0" y="0"/>
-          <a:chExt cx="0" cy="0"/>
-        </a:xfrm>
-      </p:grpSpPr>
-      <p:sp>
-        <p:nvSpPr>
-          <p:cNvPr id="102" name="Google Shape;102;ge6d407e7a1_0_0"/>
-          <p:cNvSpPr txBox="1">
-            <a:spLocks noGrp="1"/>
-          </p:cNvSpPr>
-          <p:nvPr>
-            <p:ph type="title"/>
-          </p:nvPr>
-        </p:nvSpPr>
-        <p:spPr>
-          <a:xfrm>
-            <a:off x="165100" y="0"/>
-            <a:ext cx="8645700" cy="1143000"/>
-          </a:xfrm>
-          <a:prstGeom prst="rect">
-            <a:avLst/>
-          </a:prstGeom>
-          <a:noFill/>
-          <a:ln>
-            <a:noFill/>
-          </a:ln>
-        </p:spPr>
-        <p:txBody>
-          <a:bodyPr spcFirstLastPara="1" wrap="square" lIns="91425" tIns="45700" rIns="91425" bIns="45700" anchor="ctr" anchorCtr="0">
-            <a:noAutofit/>
-          </a:bodyPr>
-          <a:lstStyle/>
-          <a:p>
-            <a:pPr marL="0" lvl="0" indent="0" algn="l" rtl="0">
-              <a:lnSpc>
-                <a:spcPct val="100000"/>
-              </a:lnSpc>
-              <a:spcBef>
-                <a:spcPts val="0"/>
-              </a:spcBef>
-              <a:spcAft>
-                <a:spcPts val="0"/>
-              </a:spcAft>
-              <a:buSzPts val="3200"/>
-              <a:buNone/>
-            </a:pPr>
-            <a:r>
-              <a:rPr lang="en-US" dirty="0"/>
-              <a:t>Set up your Conda Environment</a:t>
-            </a:r>
-            <a:endParaRPr dirty="0"/>
-          </a:p>
-        </p:txBody>
-      </p:sp>
-      <p:sp>
-        <p:nvSpPr>
-          <p:cNvPr id="103" name="Google Shape;103;ge6d407e7a1_0_0"/>
-          <p:cNvSpPr txBox="1">
-            <a:spLocks noGrp="1"/>
-          </p:cNvSpPr>
-          <p:nvPr>
-            <p:ph type="ftr" idx="11"/>
-          </p:nvPr>
-        </p:nvSpPr>
-        <p:spPr>
-          <a:xfrm>
-            <a:off x="4572000" y="6506896"/>
-            <a:ext cx="4114800" cy="365100"/>
-          </a:xfrm>
-          <a:prstGeom prst="rect">
-            <a:avLst/>
-          </a:prstGeom>
-          <a:noFill/>
-          <a:ln>
-            <a:noFill/>
-          </a:ln>
-        </p:spPr>
-        <p:txBody>
-          <a:bodyPr spcFirstLastPara="1" wrap="square" lIns="91425" tIns="45700" rIns="91425" bIns="45700" anchor="ctr" anchorCtr="0">
-            <a:noAutofit/>
-          </a:bodyPr>
-          <a:lstStyle/>
-          <a:p>
-            <a:pPr marL="0" lvl="0" indent="0" algn="r" rtl="0">
-              <a:lnSpc>
-                <a:spcPct val="100000"/>
-              </a:lnSpc>
-              <a:spcBef>
-                <a:spcPts val="0"/>
-              </a:spcBef>
-              <a:spcAft>
-                <a:spcPts val="0"/>
-              </a:spcAft>
-              <a:buSzPts val="1400"/>
-              <a:buNone/>
-            </a:pPr>
-            <a:r>
-              <a:rPr lang="en-US"/>
-              <a:t>Reproducibility Principles</a:t>
-            </a:r>
-            <a:endParaRPr/>
-          </a:p>
-        </p:txBody>
-      </p:sp>
-      <p:sp>
-        <p:nvSpPr>
-          <p:cNvPr id="104" name="Google Shape;104;ge6d407e7a1_0_0"/>
-          <p:cNvSpPr txBox="1">
-            <a:spLocks noGrp="1"/>
-          </p:cNvSpPr>
-          <p:nvPr>
-            <p:ph type="sldNum" idx="12"/>
-          </p:nvPr>
-        </p:nvSpPr>
-        <p:spPr>
-          <a:xfrm>
-            <a:off x="8686800" y="6506896"/>
-            <a:ext cx="416100" cy="365100"/>
-          </a:xfrm>
-          <a:prstGeom prst="rect">
-            <a:avLst/>
-          </a:prstGeom>
-          <a:noFill/>
-          <a:ln>
-            <a:noFill/>
-          </a:ln>
-        </p:spPr>
-        <p:txBody>
-          <a:bodyPr spcFirstLastPara="1" wrap="square" lIns="91425" tIns="45700" rIns="91425" bIns="45700" anchor="ctr" anchorCtr="0">
-            <a:noAutofit/>
-          </a:bodyPr>
-          <a:lstStyle/>
-          <a:p>
-            <a:pPr marL="0" lvl="0" indent="0" algn="r" rtl="0">
-              <a:lnSpc>
-                <a:spcPct val="100000"/>
-              </a:lnSpc>
-              <a:spcBef>
-                <a:spcPts val="0"/>
-              </a:spcBef>
-              <a:spcAft>
-                <a:spcPts val="0"/>
-              </a:spcAft>
-              <a:buSzPts val="1000"/>
-              <a:buNone/>
-            </a:pPr>
-            <a:fld id="{00000000-1234-1234-1234-123412341234}" type="slidenum">
-              <a:rPr lang="en-US"/>
-              <a:t>4</a:t>
-            </a:fld>
-            <a:endParaRPr/>
-          </a:p>
-        </p:txBody>
-      </p:sp>
-      <p:sp>
-        <p:nvSpPr>
-          <p:cNvPr id="105" name="Google Shape;105;ge6d407e7a1_0_0"/>
-          <p:cNvSpPr txBox="1"/>
-          <p:nvPr/>
-        </p:nvSpPr>
-        <p:spPr>
-          <a:xfrm>
-            <a:off x="268574" y="866775"/>
-            <a:ext cx="8418226" cy="4339619"/>
-          </a:xfrm>
-          <a:prstGeom prst="rect">
-            <a:avLst/>
-          </a:prstGeom>
-          <a:noFill/>
-          <a:ln>
-            <a:noFill/>
-          </a:ln>
-        </p:spPr>
-        <p:txBody>
-          <a:bodyPr spcFirstLastPara="1" wrap="square" lIns="91425" tIns="91425" rIns="91425" bIns="91425" anchor="t" anchorCtr="0">
-            <a:spAutoFit/>
-          </a:bodyPr>
-          <a:lstStyle/>
-          <a:p>
-            <a:pPr lvl="0">
-              <a:buClr>
-                <a:schemeClr val="dk1"/>
-              </a:buClr>
-              <a:buSzPts val="1100"/>
-            </a:pPr>
-            <a:r>
-              <a:rPr lang="en-US" sz="1800" dirty="0">
-                <a:solidFill>
-                  <a:schemeClr val="dk1"/>
-                </a:solidFill>
-                <a:highlight>
-                  <a:srgbClr val="C0C0C0"/>
-                </a:highlight>
-                <a:latin typeface="Consolas"/>
-                <a:cs typeface="Consolas"/>
-                <a:sym typeface="Roboto Medium"/>
-              </a:rPr>
-              <a:t>module load python-miniconda3/4.12.0</a:t>
-            </a:r>
-          </a:p>
-          <a:p>
-            <a:pPr lvl="0">
-              <a:buClr>
-                <a:schemeClr val="dk1"/>
-              </a:buClr>
-              <a:buSzPts val="1100"/>
-            </a:pPr>
-            <a:r>
-              <a:rPr lang="en-US" sz="1800" dirty="0">
-                <a:solidFill>
-                  <a:schemeClr val="dk1"/>
-                </a:solidFill>
-                <a:highlight>
-                  <a:srgbClr val="C0C0C0"/>
-                </a:highlight>
-                <a:latin typeface="Consolas"/>
-                <a:cs typeface="Consolas"/>
-                <a:sym typeface="Roboto Medium"/>
-              </a:rPr>
-              <a:t>conda create –n </a:t>
-            </a:r>
-            <a:r>
-              <a:rPr lang="en-US" sz="1800" dirty="0" err="1">
-                <a:solidFill>
-                  <a:schemeClr val="dk1"/>
-                </a:solidFill>
-                <a:highlight>
-                  <a:srgbClr val="C0C0C0"/>
-                </a:highlight>
-                <a:latin typeface="Consolas"/>
-                <a:cs typeface="Consolas"/>
-                <a:sym typeface="Roboto Medium"/>
-              </a:rPr>
-              <a:t>edgar</a:t>
-            </a:r>
-            <a:r>
-              <a:rPr lang="en-US" sz="1800" dirty="0">
-                <a:solidFill>
-                  <a:schemeClr val="dk1"/>
-                </a:solidFill>
-                <a:highlight>
-                  <a:srgbClr val="C0C0C0"/>
-                </a:highlight>
-                <a:latin typeface="Consolas"/>
-                <a:cs typeface="Consolas"/>
-                <a:sym typeface="Roboto Medium"/>
-              </a:rPr>
-              <a:t> python</a:t>
-            </a:r>
-          </a:p>
-          <a:p>
-            <a:pPr lvl="0">
-              <a:buClr>
-                <a:schemeClr val="dk1"/>
-              </a:buClr>
-              <a:buSzPts val="1100"/>
-            </a:pPr>
-            <a:r>
-              <a:rPr lang="en-US" sz="1800" dirty="0">
-                <a:solidFill>
-                  <a:schemeClr val="dk1"/>
-                </a:solidFill>
-                <a:highlight>
-                  <a:srgbClr val="C0C0C0"/>
-                </a:highlight>
-                <a:latin typeface="Consolas"/>
-                <a:cs typeface="Consolas"/>
-                <a:sym typeface="Roboto Medium"/>
-              </a:rPr>
-              <a:t>source activate </a:t>
-            </a:r>
-            <a:r>
-              <a:rPr lang="en-US" sz="1800" dirty="0" err="1">
-                <a:solidFill>
-                  <a:schemeClr val="dk1"/>
-                </a:solidFill>
-                <a:highlight>
-                  <a:srgbClr val="C0C0C0"/>
-                </a:highlight>
-                <a:latin typeface="Consolas"/>
-                <a:cs typeface="Consolas"/>
-                <a:sym typeface="Roboto Medium"/>
-              </a:rPr>
-              <a:t>edgar</a:t>
-            </a:r>
-            <a:endParaRPr lang="en-US" sz="1800" dirty="0">
-              <a:solidFill>
-                <a:schemeClr val="dk1"/>
-              </a:solidFill>
-              <a:highlight>
-                <a:srgbClr val="C0C0C0"/>
-              </a:highlight>
-              <a:latin typeface="Consolas"/>
-              <a:cs typeface="Consolas"/>
-              <a:sym typeface="Roboto Medium"/>
-            </a:endParaRPr>
-          </a:p>
-          <a:p>
-            <a:pPr lvl="0">
-              <a:buClr>
-                <a:schemeClr val="dk1"/>
-              </a:buClr>
-              <a:buSzPts val="1100"/>
-            </a:pPr>
-            <a:endParaRPr lang="en-US" sz="1800" dirty="0">
-              <a:solidFill>
-                <a:schemeClr val="dk1"/>
-              </a:solidFill>
-              <a:highlight>
-                <a:srgbClr val="C0C0C0"/>
-              </a:highlight>
-              <a:latin typeface="Consolas"/>
-              <a:cs typeface="Consolas"/>
-              <a:sym typeface="Roboto Medium"/>
-            </a:endParaRPr>
-          </a:p>
-          <a:p>
-            <a:pPr marL="0" lvl="0" indent="0" algn="l" rtl="0">
-              <a:spcBef>
-                <a:spcPts val="0"/>
-              </a:spcBef>
-              <a:spcAft>
-                <a:spcPts val="0"/>
-              </a:spcAft>
-              <a:buClr>
-                <a:schemeClr val="dk1"/>
-              </a:buClr>
-              <a:buSzPts val="1100"/>
-              <a:buFont typeface="Arial"/>
-              <a:buNone/>
-            </a:pPr>
-            <a:r>
-              <a:rPr lang="en-US" sz="1800" dirty="0">
-                <a:solidFill>
-                  <a:schemeClr val="dk1"/>
-                </a:solidFill>
-                <a:highlight>
-                  <a:srgbClr val="C0C0C0"/>
-                </a:highlight>
-                <a:latin typeface="Consolas"/>
-                <a:cs typeface="Consolas"/>
-                <a:sym typeface="Roboto Medium"/>
-              </a:rPr>
-              <a:t>cd</a:t>
-            </a:r>
-          </a:p>
-          <a:p>
-            <a:pPr>
-              <a:buClr>
-                <a:schemeClr val="dk1"/>
-              </a:buClr>
-              <a:buSzPts val="1100"/>
-            </a:pPr>
-            <a:r>
-              <a:rPr lang="en-US" sz="1800" dirty="0">
-                <a:highlight>
-                  <a:srgbClr val="CCCCCC"/>
-                </a:highlight>
-                <a:latin typeface="Consolas"/>
-                <a:ea typeface="Consolas"/>
-                <a:cs typeface="Consolas"/>
-                <a:sym typeface="Consolas"/>
-              </a:rPr>
-              <a:t>module load git</a:t>
-            </a:r>
-            <a:endParaRPr lang="en-US" sz="1800" dirty="0">
-              <a:solidFill>
-                <a:schemeClr val="dk1"/>
-              </a:solidFill>
-              <a:highlight>
-                <a:srgbClr val="C0C0C0"/>
-              </a:highlight>
-              <a:latin typeface="Consolas"/>
-              <a:cs typeface="Consolas"/>
-              <a:sym typeface="Roboto Medium"/>
-            </a:endParaRPr>
-          </a:p>
-          <a:p>
-            <a:pPr lvl="0">
-              <a:buClr>
-                <a:schemeClr val="dk1"/>
-              </a:buClr>
-              <a:buSzPts val="1100"/>
-            </a:pPr>
-            <a:r>
-              <a:rPr lang="en-US" sz="1800" dirty="0">
-                <a:solidFill>
-                  <a:schemeClr val="dk1"/>
-                </a:solidFill>
-                <a:highlight>
-                  <a:srgbClr val="C0C0C0"/>
-                </a:highlight>
-                <a:latin typeface="Consolas"/>
-                <a:cs typeface="Consolas"/>
-                <a:sym typeface="Roboto Medium"/>
-              </a:rPr>
-              <a:t>git clone </a:t>
-            </a:r>
-            <a:r>
-              <a:rPr lang="en-US" sz="1800" dirty="0">
-                <a:solidFill>
-                  <a:schemeClr val="dk1"/>
-                </a:solidFill>
-                <a:highlight>
-                  <a:srgbClr val="C0C0C0"/>
-                </a:highlight>
-                <a:latin typeface="Consolas"/>
-                <a:cs typeface="Consolas"/>
-                <a:sym typeface="Roboto Medium"/>
-                <a:hlinkClick r:id="rId3"/>
-              </a:rPr>
-              <a:t>https://github.com/rs-kellogg/edgar2data.git</a:t>
-            </a:r>
-            <a:endParaRPr lang="en-US" sz="1800" dirty="0">
-              <a:solidFill>
-                <a:schemeClr val="dk1"/>
-              </a:solidFill>
-              <a:highlight>
-                <a:srgbClr val="C0C0C0"/>
-              </a:highlight>
-              <a:latin typeface="Consolas"/>
-              <a:cs typeface="Consolas"/>
-              <a:sym typeface="Roboto Medium"/>
-            </a:endParaRPr>
-          </a:p>
-          <a:p>
-            <a:pPr lvl="0">
-              <a:buClr>
-                <a:schemeClr val="dk1"/>
-              </a:buClr>
-              <a:buSzPts val="1100"/>
-            </a:pPr>
-            <a:r>
-              <a:rPr lang="en-US" sz="1800" dirty="0">
-                <a:solidFill>
-                  <a:schemeClr val="dk1"/>
-                </a:solidFill>
-                <a:highlight>
-                  <a:srgbClr val="C0C0C0"/>
-                </a:highlight>
-                <a:latin typeface="Consolas"/>
-                <a:cs typeface="Consolas"/>
-                <a:sym typeface="Roboto Medium"/>
-              </a:rPr>
-              <a:t>cd edgar2data</a:t>
-            </a:r>
-          </a:p>
-          <a:p>
-            <a:pPr lvl="0">
-              <a:buClr>
-                <a:schemeClr val="dk1"/>
-              </a:buClr>
-              <a:buSzPts val="1100"/>
-            </a:pPr>
-            <a:r>
-              <a:rPr lang="en-US" sz="1800" dirty="0">
-                <a:solidFill>
-                  <a:schemeClr val="dk1"/>
-                </a:solidFill>
-                <a:highlight>
-                  <a:srgbClr val="C0C0C0"/>
-                </a:highlight>
-                <a:latin typeface="Consolas"/>
-                <a:cs typeface="Consolas"/>
-                <a:sym typeface="Roboto Medium"/>
-              </a:rPr>
-              <a:t>pip install .</a:t>
-            </a:r>
-          </a:p>
-          <a:p>
-            <a:pPr lvl="0">
-              <a:buClr>
-                <a:schemeClr val="dk1"/>
-              </a:buClr>
-              <a:buSzPts val="1100"/>
-            </a:pPr>
-            <a:endParaRPr lang="en-US" sz="1800" dirty="0">
-              <a:solidFill>
-                <a:schemeClr val="dk1"/>
-              </a:solidFill>
-              <a:highlight>
-                <a:srgbClr val="C0C0C0"/>
-              </a:highlight>
-              <a:latin typeface="Consolas"/>
-              <a:cs typeface="Consolas"/>
-              <a:sym typeface="Roboto Medium"/>
-            </a:endParaRPr>
-          </a:p>
-          <a:p>
-            <a:pPr lvl="0">
-              <a:buClr>
-                <a:schemeClr val="dk1"/>
-              </a:buClr>
-              <a:buSzPts val="1100"/>
-            </a:pPr>
-            <a:r>
-              <a:rPr lang="en-US" sz="1800" dirty="0">
-                <a:solidFill>
-                  <a:schemeClr val="dk1"/>
-                </a:solidFill>
-                <a:highlight>
-                  <a:srgbClr val="C0C0C0"/>
-                </a:highlight>
-                <a:latin typeface="Consolas"/>
-                <a:cs typeface="Consolas"/>
-                <a:sym typeface="Roboto Medium"/>
-              </a:rPr>
-              <a:t>cd ~/edgar2data</a:t>
-            </a:r>
-          </a:p>
-          <a:p>
-            <a:pPr lvl="0">
-              <a:buClr>
-                <a:schemeClr val="dk1"/>
-              </a:buClr>
-              <a:buSzPts val="1100"/>
-            </a:pPr>
-            <a:r>
-              <a:rPr lang="en-US" sz="1800" dirty="0">
-                <a:solidFill>
-                  <a:schemeClr val="dk1"/>
-                </a:solidFill>
-                <a:highlight>
-                  <a:srgbClr val="C0C0C0"/>
-                </a:highlight>
-                <a:latin typeface="Consolas"/>
-                <a:cs typeface="Consolas"/>
-                <a:sym typeface="Roboto Medium"/>
-              </a:rPr>
-              <a:t>pip install </a:t>
-            </a:r>
-            <a:r>
-              <a:rPr lang="en-US" sz="1800" dirty="0" err="1">
-                <a:solidFill>
-                  <a:schemeClr val="dk1"/>
-                </a:solidFill>
-                <a:highlight>
-                  <a:srgbClr val="C0C0C0"/>
-                </a:highlight>
-                <a:latin typeface="Consolas"/>
-                <a:cs typeface="Consolas"/>
-                <a:sym typeface="Roboto Medium"/>
-              </a:rPr>
-              <a:t>pytest</a:t>
-            </a:r>
-            <a:endParaRPr lang="en-US" sz="1800" dirty="0">
-              <a:solidFill>
-                <a:schemeClr val="dk1"/>
-              </a:solidFill>
-              <a:highlight>
-                <a:srgbClr val="C0C0C0"/>
-              </a:highlight>
-              <a:latin typeface="Consolas"/>
-              <a:cs typeface="Consolas"/>
-              <a:sym typeface="Roboto Medium"/>
-            </a:endParaRPr>
-          </a:p>
-          <a:p>
-            <a:pPr lvl="0">
-              <a:buClr>
-                <a:schemeClr val="dk1"/>
-              </a:buClr>
-              <a:buSzPts val="1100"/>
-            </a:pPr>
-            <a:r>
-              <a:rPr lang="en-US" sz="1800" dirty="0" err="1">
-                <a:solidFill>
-                  <a:schemeClr val="dk1"/>
-                </a:solidFill>
-                <a:highlight>
-                  <a:srgbClr val="C0C0C0"/>
-                </a:highlight>
-                <a:latin typeface="Consolas"/>
-                <a:cs typeface="Consolas"/>
-                <a:sym typeface="Roboto Medium"/>
-              </a:rPr>
-              <a:t>pytest</a:t>
-            </a:r>
-            <a:endParaRPr lang="en-US" sz="1800" dirty="0">
-              <a:solidFill>
-                <a:schemeClr val="dk1"/>
-              </a:solidFill>
-              <a:highlight>
-                <a:srgbClr val="C0C0C0"/>
-              </a:highlight>
-              <a:latin typeface="Consolas"/>
-              <a:cs typeface="Consolas"/>
-              <a:sym typeface="Roboto Medium"/>
-            </a:endParaRPr>
-          </a:p>
-          <a:p>
-            <a:pPr lvl="0">
-              <a:buClr>
-                <a:schemeClr val="dk1"/>
-              </a:buClr>
-              <a:buSzPts val="1100"/>
-            </a:pPr>
-            <a:endParaRPr lang="en-US" sz="1800" dirty="0">
-              <a:solidFill>
-                <a:schemeClr val="dk1"/>
-              </a:solidFill>
-              <a:highlight>
-                <a:srgbClr val="C0C0C0"/>
-              </a:highlight>
-              <a:latin typeface="Consolas"/>
-              <a:cs typeface="Consolas"/>
-              <a:sym typeface="Roboto Medium"/>
-            </a:endParaRPr>
-          </a:p>
-          <a:p>
-            <a:pPr>
-              <a:buClr>
-                <a:schemeClr val="dk1"/>
-              </a:buClr>
-              <a:buSzPts val="1100"/>
-            </a:pPr>
-            <a:r>
-              <a:rPr lang="en-US" sz="1800" dirty="0">
-                <a:solidFill>
-                  <a:schemeClr val="dk1"/>
-                </a:solidFill>
-                <a:highlight>
-                  <a:srgbClr val="C0C0C0"/>
-                </a:highlight>
-                <a:latin typeface="Consolas"/>
-                <a:cs typeface="Consolas"/>
-                <a:sym typeface="Roboto Medium"/>
-              </a:rPr>
-              <a:t>cd ~/workshop_2022/</a:t>
-            </a:r>
-          </a:p>
-        </p:txBody>
-      </p:sp>
-    </p:spTree>
-    <p:extLst>
-      <p:ext uri="{BB962C8B-B14F-4D97-AF65-F5344CB8AC3E}">
-        <p14:creationId xmlns:p14="http://schemas.microsoft.com/office/powerpoint/2010/main" val="2550150182"/>
-      </p:ext>
-    </p:extLst>
-  </p:cSld>
-  <p:clrMapOvr>
-    <a:masterClrMapping/>
-  </p:clrMapOvr>
-</p:sld>
-</file>
-
 <file path=ppt/slides/slide5.xml><?xml version="1.0" encoding="utf-8"?>
 <p:sld xmlns:a="http://schemas.openxmlformats.org/drawingml/2006/main" xmlns:r="http://schemas.openxmlformats.org/officeDocument/2006/relationships" xmlns:p="http://schemas.openxmlformats.org/presentationml/2006/main">
   <p:cSld>
@@ -20043,15 +19637,7 @@
             </a:pPr>
             <a:r>
               <a:rPr lang="en-US" dirty="0"/>
-              <a:t>Git and </a:t>
-            </a:r>
-            <a:r>
-              <a:rPr lang="en-US" dirty="0" err="1"/>
-              <a:t>Github</a:t>
-            </a:r>
-            <a:r>
-              <a:rPr lang="en-US" dirty="0"/>
-              <a:t> Overview</a:t>
+              <a:t>Git and Github Overview</a:t>
             </a:r>
             <a:endParaRPr dirty="0"/>
           </a:p>
@@ -20436,7 +20022,7 @@
         <p:spPr>
           <a:xfrm>
             <a:off x="268574" y="904875"/>
-            <a:ext cx="7973057" cy="5432226"/>
+            <a:ext cx="7973057" cy="4893617"/>
           </a:xfrm>
           <a:prstGeom prst="rect">
             <a:avLst/>
@@ -20589,15 +20175,7 @@
             </a:pPr>
             <a:r>
               <a:rPr lang="en-US" sz="1800" dirty="0"/>
-              <a:t>The first time you load git on KLC, you need to set the username and email it will use when it records your commits. Note that this will have no bearing on your </a:t>
-            </a:r>
-            <a:r>
-              <a:rPr lang="en-US" sz="1800" dirty="0" err="1"/>
-              <a:t>Github</a:t>
-            </a:r>
-            <a:r>
-              <a:rPr lang="en-US" sz="1800" dirty="0"/>
-              <a:t> login later on.</a:t>
+              <a:t>The first time you load git on KLC, you need to set the username and email it will use when it records your commits. Note that this will have no bearing on your Github login later on.</a:t>
             </a:r>
           </a:p>
           <a:p>
@@ -20783,51 +20361,6 @@
               <a:rPr lang="en-US" sz="1800" dirty="0"/>
               <a:t>  </a:t>
             </a:r>
-          </a:p>
-          <a:p>
-            <a:pPr marL="11113" lvl="0">
-              <a:buClr>
-                <a:schemeClr val="dk1"/>
-              </a:buClr>
-              <a:buSzPts val="1100"/>
-            </a:pPr>
-            <a:r>
-              <a:rPr lang="en-US" sz="1800" dirty="0"/>
-              <a:t>NU IT </a:t>
-            </a:r>
-            <a:r>
-              <a:rPr lang="en-US" sz="1800" dirty="0" err="1"/>
-              <a:t>github</a:t>
-            </a:r>
-            <a:r>
-              <a:rPr lang="en-US" sz="1800" dirty="0"/>
-              <a:t>: </a:t>
-            </a:r>
-            <a:r>
-              <a:rPr lang="en-US" sz="1800" dirty="0">
-                <a:hlinkClick r:id="rId5">
-                  <a:extLst>
-                    <a:ext uri="{A12FA001-AC4F-418D-AE19-62706E023703}">
-                      <ahyp:hlinkClr xmlns:ahyp="http://schemas.microsoft.com/office/drawing/2018/hyperlinkcolor" val="tx"/>
-                    </a:ext>
-                  </a:extLst>
-                </a:hlinkClick>
-              </a:rPr>
-              <a:t>https://github.com/nuitrcs/gitworkshop</a:t>
-            </a:r>
-            <a:r>
-              <a:rPr lang="en-US" sz="1800" dirty="0"/>
-              <a:t>  </a:t>
-            </a:r>
-          </a:p>
-          <a:p>
-            <a:pPr marL="457200" lvl="0">
-              <a:buClr>
-                <a:schemeClr val="dk1"/>
-              </a:buClr>
-              <a:buSzPts val="1100"/>
-            </a:pPr>
-            <a:endParaRPr sz="1700" dirty="0"/>
           </a:p>
         </p:txBody>
       </p:sp>
@@ -21265,6 +20798,28 @@
               <a:buSzPts val="1100"/>
             </a:pPr>
             <a:r>
+              <a:rPr lang="en-US" sz="1800" dirty="0">
+                <a:solidFill>
+                  <a:schemeClr val="dk1"/>
+                </a:solidFill>
+                <a:highlight>
+                  <a:srgbClr val="C0C0C0"/>
+                </a:highlight>
+                <a:latin typeface="Consolas"/>
+                <a:cs typeface="Consolas"/>
+                <a:sym typeface="Roboto Medium"/>
+              </a:rPr>
+              <a:t>cd </a:t>
+            </a:r>
+          </a:p>
+          <a:p>
+            <a:pPr marL="11113" lvl="2" indent="454025">
+              <a:buClr>
+                <a:schemeClr val="dk1"/>
+              </a:buClr>
+              <a:buSzPts val="1100"/>
+            </a:pPr>
+            <a:r>
               <a:rPr lang="en-US" sz="1800" dirty="0" err="1">
                 <a:solidFill>
                   <a:schemeClr val="dk1"/>
@@ -21290,7 +20845,7 @@
                 <a:cs typeface="Consolas"/>
                 <a:sym typeface="Roboto Medium"/>
               </a:rPr>
-              <a:t> ~/practice</a:t>
+              <a:t> practice</a:t>
             </a:r>
           </a:p>
           <a:p>
@@ -21312,57 +20867,7 @@
                 <a:cs typeface="Consolas"/>
                 <a:sym typeface="Roboto Medium"/>
               </a:rPr>
-              <a:t>cd ~/practice</a:t>
-            </a:r>
-          </a:p>
-          <a:p>
-            <a:pPr marL="11113" lvl="2" indent="454025">
-              <a:buClr>
-                <a:schemeClr val="dk1"/>
-              </a:buClr>
-              <a:buSzPts val="1100"/>
-            </a:pPr>
-            <a:r>
-              <a:rPr lang="en-US" sz="1800" dirty="0">
-                <a:solidFill>
-                  <a:schemeClr val="dk1"/>
-                </a:solidFill>
-                <a:highlight>
-                  <a:srgbClr val="C0C0C0"/>
-                </a:highlight>
-                <a:latin typeface="Consolas"/>
-                <a:cs typeface="Consolas"/>
-                <a:sym typeface="Roboto Medium"/>
-              </a:rPr>
-              <a:t>cp ~/workshop_2022/Session3_Test/python/</a:t>
-            </a:r>
-            <a:r>
-              <a:rPr lang="en-US" sz="1800" dirty="0" err="1">
-                <a:solidFill>
-                  <a:schemeClr val="dk1"/>
-                </a:solidFill>
-                <a:highlight>
-                  <a:srgbClr val="C0C0C0"/>
-                </a:highlight>
-                <a:latin typeface="Consolas"/>
-                <a:cs typeface="Consolas"/>
-                <a:sym typeface="Roboto Medium"/>
-              </a:rPr>
-              <a:t>test_edgar.py</a:t>
-            </a:r>
-            <a:r>
-              <a:rPr lang="en-US" sz="1800" dirty="0">
-                <a:solidFill>
-                  <a:schemeClr val="dk1"/>
-                </a:solidFill>
-                <a:highlight>
-                  <a:srgbClr val="C0C0C0"/>
-                </a:highlight>
-                <a:latin typeface="Consolas"/>
-                <a:cs typeface="Consolas"/>
-                <a:sym typeface="Roboto Medium"/>
-              </a:rPr>
-              <a:t> .</a:t>
+              <a:t>cd practice</a:t>
             </a:r>
           </a:p>
           <a:p>
@@ -21787,15 +21292,7 @@
             </a:pPr>
             <a:r>
               <a:rPr lang="en-US" sz="1800" dirty="0"/>
-              <a:t>Let’s make some basic changes to the Git repo we initialized. For instance, let’s start by moving in all the FEC files we cloned from </a:t>
-            </a:r>
-            <a:r>
-              <a:rPr lang="en-US" sz="1800" dirty="0" err="1"/>
-              <a:t>Github</a:t>
-            </a:r>
-            <a:r>
-              <a:rPr lang="en-US" sz="1800" dirty="0"/>
-              <a:t>.</a:t>
+              <a:t>Let’s make some basic changes to the Git repo we initialized. For instance, let’s start by moving in all the FEC files we cloned from Github.</a:t>
             </a:r>
           </a:p>
           <a:p>
@@ -21833,33 +21330,7 @@
                 <a:latin typeface="Consolas"/>
                 <a:cs typeface="Consolas"/>
               </a:rPr>
-              <a:t>cp ../Session3_Test/python/</a:t>
-            </a:r>
-            <a:r>
-              <a:rPr lang="en-US" sz="1800" dirty="0" err="1">
-                <a:solidFill>
-                  <a:schemeClr val="dk1"/>
-                </a:solidFill>
-                <a:highlight>
-                  <a:srgbClr val="C0C0C0"/>
-                </a:highlight>
-                <a:latin typeface="Consolas"/>
-                <a:cs typeface="Consolas"/>
-              </a:rPr>
-              <a:t>test_edgar.py</a:t>
-            </a:r>
-            <a:r>
-              <a:rPr lang="en-US" sz="1800" dirty="0">
-                <a:solidFill>
-                  <a:schemeClr val="dk1"/>
-                </a:solidFill>
-                <a:highlight>
-                  <a:srgbClr val="C0C0C0"/>
-                </a:highlight>
-                <a:latin typeface="Consolas"/>
-                <a:cs typeface="Consolas"/>
-              </a:rPr>
-              <a:t> .</a:t>
+              <a:t>cp -R ~/workshop_2022/Session3_Test/python/ .</a:t>
             </a:r>
           </a:p>
           <a:p>

</xml_diff>